<commit_message>
modify git.ppt and map_181115
181119
更新git.ppt中搭建服务器的内容
更新map_181115中绘制小车的程序
</commit_message>
<xml_diff>
--- a/ppt/git.pptx
+++ b/ppt/git.pptx
@@ -52,7 +52,13 @@
     <p:sldId id="300" r:id="rId46"/>
     <p:sldId id="302" r:id="rId47"/>
     <p:sldId id="301" r:id="rId48"/>
-    <p:sldId id="284" r:id="rId49"/>
+    <p:sldId id="305" r:id="rId49"/>
+    <p:sldId id="306" r:id="rId50"/>
+    <p:sldId id="307" r:id="rId51"/>
+    <p:sldId id="309" r:id="rId52"/>
+    <p:sldId id="310" r:id="rId53"/>
+    <p:sldId id="311" r:id="rId54"/>
+    <p:sldId id="284" r:id="rId55"/>
   </p:sldIdLst>
   <p:sldSz cx="9144000" cy="6858000" type="screen4x3"/>
   <p:notesSz cx="6858000" cy="9144000"/>
@@ -336,7 +342,7 @@
             <a:fld id="{530820CF-B880-4189-942D-D702A7CBA730}" type="datetimeFigureOut">
               <a:rPr lang="zh-CN" altLang="en-US" smtClean="0"/>
               <a:pPr/>
-              <a:t>2018/11/13</a:t>
+              <a:t>2018/11/19</a:t>
             </a:fld>
             <a:endParaRPr lang="zh-CN" altLang="en-US"/>
           </a:p>
@@ -503,7 +509,7 @@
             <a:fld id="{530820CF-B880-4189-942D-D702A7CBA730}" type="datetimeFigureOut">
               <a:rPr lang="zh-CN" altLang="en-US" smtClean="0"/>
               <a:pPr/>
-              <a:t>2018/11/13</a:t>
+              <a:t>2018/11/19</a:t>
             </a:fld>
             <a:endParaRPr lang="zh-CN" altLang="en-US"/>
           </a:p>
@@ -680,7 +686,7 @@
             <a:fld id="{530820CF-B880-4189-942D-D702A7CBA730}" type="datetimeFigureOut">
               <a:rPr lang="zh-CN" altLang="en-US" smtClean="0"/>
               <a:pPr/>
-              <a:t>2018/11/13</a:t>
+              <a:t>2018/11/19</a:t>
             </a:fld>
             <a:endParaRPr lang="zh-CN" altLang="en-US"/>
           </a:p>
@@ -847,7 +853,7 @@
             <a:fld id="{530820CF-B880-4189-942D-D702A7CBA730}" type="datetimeFigureOut">
               <a:rPr lang="zh-CN" altLang="en-US" smtClean="0"/>
               <a:pPr/>
-              <a:t>2018/11/13</a:t>
+              <a:t>2018/11/19</a:t>
             </a:fld>
             <a:endParaRPr lang="zh-CN" altLang="en-US"/>
           </a:p>
@@ -1090,7 +1096,7 @@
             <a:fld id="{530820CF-B880-4189-942D-D702A7CBA730}" type="datetimeFigureOut">
               <a:rPr lang="zh-CN" altLang="en-US" smtClean="0"/>
               <a:pPr/>
-              <a:t>2018/11/13</a:t>
+              <a:t>2018/11/19</a:t>
             </a:fld>
             <a:endParaRPr lang="zh-CN" altLang="en-US"/>
           </a:p>
@@ -1375,7 +1381,7 @@
             <a:fld id="{530820CF-B880-4189-942D-D702A7CBA730}" type="datetimeFigureOut">
               <a:rPr lang="zh-CN" altLang="en-US" smtClean="0"/>
               <a:pPr/>
-              <a:t>2018/11/13</a:t>
+              <a:t>2018/11/19</a:t>
             </a:fld>
             <a:endParaRPr lang="zh-CN" altLang="en-US"/>
           </a:p>
@@ -1794,7 +1800,7 @@
             <a:fld id="{530820CF-B880-4189-942D-D702A7CBA730}" type="datetimeFigureOut">
               <a:rPr lang="zh-CN" altLang="en-US" smtClean="0"/>
               <a:pPr/>
-              <a:t>2018/11/13</a:t>
+              <a:t>2018/11/19</a:t>
             </a:fld>
             <a:endParaRPr lang="zh-CN" altLang="en-US"/>
           </a:p>
@@ -1909,7 +1915,7 @@
             <a:fld id="{530820CF-B880-4189-942D-D702A7CBA730}" type="datetimeFigureOut">
               <a:rPr lang="zh-CN" altLang="en-US" smtClean="0"/>
               <a:pPr/>
-              <a:t>2018/11/13</a:t>
+              <a:t>2018/11/19</a:t>
             </a:fld>
             <a:endParaRPr lang="zh-CN" altLang="en-US"/>
           </a:p>
@@ -2001,7 +2007,7 @@
             <a:fld id="{530820CF-B880-4189-942D-D702A7CBA730}" type="datetimeFigureOut">
               <a:rPr lang="zh-CN" altLang="en-US" smtClean="0"/>
               <a:pPr/>
-              <a:t>2018/11/13</a:t>
+              <a:t>2018/11/19</a:t>
             </a:fld>
             <a:endParaRPr lang="zh-CN" altLang="en-US"/>
           </a:p>
@@ -2275,7 +2281,7 @@
             <a:fld id="{530820CF-B880-4189-942D-D702A7CBA730}" type="datetimeFigureOut">
               <a:rPr lang="zh-CN" altLang="en-US" smtClean="0"/>
               <a:pPr/>
-              <a:t>2018/11/13</a:t>
+              <a:t>2018/11/19</a:t>
             </a:fld>
             <a:endParaRPr lang="zh-CN" altLang="en-US"/>
           </a:p>
@@ -2525,7 +2531,7 @@
             <a:fld id="{530820CF-B880-4189-942D-D702A7CBA730}" type="datetimeFigureOut">
               <a:rPr lang="zh-CN" altLang="en-US" smtClean="0"/>
               <a:pPr/>
-              <a:t>2018/11/13</a:t>
+              <a:t>2018/11/19</a:t>
             </a:fld>
             <a:endParaRPr lang="zh-CN" altLang="en-US"/>
           </a:p>
@@ -2735,7 +2741,7 @@
             <a:fld id="{530820CF-B880-4189-942D-D702A7CBA730}" type="datetimeFigureOut">
               <a:rPr lang="zh-CN" altLang="en-US" smtClean="0"/>
               <a:pPr/>
-              <a:t>2018/11/13</a:t>
+              <a:t>2018/11/19</a:t>
             </a:fld>
             <a:endParaRPr lang="zh-CN" altLang="en-US"/>
           </a:p>
@@ -18559,20 +18565,608 @@
             <p:ph idx="1"/>
           </p:nvPr>
         </p:nvSpPr>
-        <p:spPr/>
+        <p:spPr>
+          <a:xfrm>
+            <a:off x="457200" y="1600200"/>
+            <a:ext cx="4329114" cy="4525963"/>
+          </a:xfrm>
+        </p:spPr>
         <p:txBody>
-          <a:bodyPr/>
+          <a:bodyPr>
+            <a:normAutofit fontScale="92500" lnSpcReduction="10000"/>
+          </a:bodyPr>
           <a:lstStyle/>
           <a:p>
             <a:r>
-              <a:rPr lang="en-US" dirty="0" err="1" smtClean="0"/>
-              <a:t>ubuntu</a:t>
-            </a:r>
-            <a:r>
-              <a:rPr lang="zh-CN" altLang="en-US" dirty="0" smtClean="0"/>
+              <a:rPr lang="en-US" sz="2400" dirty="0" err="1" smtClean="0"/>
+              <a:t>CentOS</a:t>
+            </a:r>
+            <a:r>
+              <a:rPr lang="zh-CN" altLang="en-US" sz="2400" dirty="0" smtClean="0"/>
               <a:t>系统</a:t>
             </a:r>
-            <a:endParaRPr lang="zh-CN" altLang="en-US" dirty="0"/>
+            <a:endParaRPr lang="en-US" altLang="zh-CN" sz="2400" dirty="0" smtClean="0"/>
+          </a:p>
+          <a:p>
+            <a:pPr>
+              <a:buFont typeface="Wingdings" pitchFamily="2" charset="2"/>
+              <a:buChar char="Ø"/>
+            </a:pPr>
+            <a:r>
+              <a:rPr lang="zh-CN" altLang="en-US" sz="2400" dirty="0" smtClean="0"/>
+              <a:t>安装</a:t>
+            </a:r>
+            <a:endParaRPr lang="en-US" altLang="zh-CN" sz="2400" dirty="0" smtClean="0"/>
+          </a:p>
+          <a:p>
+            <a:pPr marL="514350" indent="-514350">
+              <a:buFont typeface="+mj-lt"/>
+              <a:buAutoNum type="arabicPeriod"/>
+            </a:pPr>
+            <a:r>
+              <a:rPr lang="zh-CN" altLang="en-US" sz="1600" dirty="0" smtClean="0"/>
+              <a:t>切换到</a:t>
+            </a:r>
+            <a:r>
+              <a:rPr lang="en-US" altLang="zh-CN" sz="1600" dirty="0" smtClean="0"/>
+              <a:t>root</a:t>
+            </a:r>
+            <a:r>
+              <a:rPr lang="zh-CN" altLang="en-US" sz="1600" dirty="0" smtClean="0"/>
+              <a:t>用户（</a:t>
+            </a:r>
+            <a:r>
+              <a:rPr lang="en-US" altLang="zh-CN" sz="1600" dirty="0" err="1" smtClean="0"/>
+              <a:t>su</a:t>
+            </a:r>
+            <a:r>
+              <a:rPr lang="zh-CN" altLang="en-US" sz="1600" dirty="0" smtClean="0"/>
+              <a:t>）或有相关权限的用户（</a:t>
+            </a:r>
+            <a:r>
+              <a:rPr lang="en-US" altLang="zh-CN" sz="1600" dirty="0" err="1" smtClean="0"/>
+              <a:t>su</a:t>
+            </a:r>
+            <a:r>
+              <a:rPr lang="en-US" altLang="zh-CN" sz="1600" dirty="0" smtClean="0"/>
+              <a:t> username</a:t>
+            </a:r>
+            <a:r>
+              <a:rPr lang="zh-CN" altLang="en-US" sz="1600" dirty="0" smtClean="0"/>
+              <a:t>）</a:t>
+            </a:r>
+            <a:endParaRPr lang="en-US" altLang="zh-CN" sz="1600" dirty="0" smtClean="0"/>
+          </a:p>
+          <a:p>
+            <a:pPr marL="514350" indent="-514350">
+              <a:buFont typeface="+mj-lt"/>
+              <a:buAutoNum type="arabicPeriod"/>
+            </a:pPr>
+            <a:r>
+              <a:rPr lang="zh-CN" altLang="en-US" sz="1600" dirty="0" smtClean="0"/>
+              <a:t>依赖检查（若缺少则会下载安装）</a:t>
+            </a:r>
+            <a:endParaRPr lang="en-US" altLang="zh-CN" sz="1600" dirty="0" smtClean="0"/>
+          </a:p>
+          <a:p>
+            <a:pPr marL="514350" indent="-514350"/>
+            <a:r>
+              <a:rPr lang="en-US" sz="1600" dirty="0" smtClean="0">
+                <a:solidFill>
+                  <a:schemeClr val="tx2">
+                    <a:lumMod val="60000"/>
+                    <a:lumOff val="40000"/>
+                  </a:schemeClr>
+                </a:solidFill>
+              </a:rPr>
+              <a:t>yum install curl-</a:t>
+            </a:r>
+            <a:r>
+              <a:rPr lang="en-US" sz="1600" dirty="0" err="1" smtClean="0">
+                <a:solidFill>
+                  <a:schemeClr val="tx2">
+                    <a:lumMod val="60000"/>
+                    <a:lumOff val="40000"/>
+                  </a:schemeClr>
+                </a:solidFill>
+              </a:rPr>
+              <a:t>devel</a:t>
+            </a:r>
+            <a:r>
+              <a:rPr lang="en-US" sz="1600" dirty="0" smtClean="0">
+                <a:solidFill>
+                  <a:schemeClr val="tx2">
+                    <a:lumMod val="60000"/>
+                    <a:lumOff val="40000"/>
+                  </a:schemeClr>
+                </a:solidFill>
+              </a:rPr>
+              <a:t> expat-</a:t>
+            </a:r>
+            <a:r>
+              <a:rPr lang="en-US" sz="1600" dirty="0" err="1" smtClean="0">
+                <a:solidFill>
+                  <a:schemeClr val="tx2">
+                    <a:lumMod val="60000"/>
+                    <a:lumOff val="40000"/>
+                  </a:schemeClr>
+                </a:solidFill>
+              </a:rPr>
+              <a:t>devel</a:t>
+            </a:r>
+            <a:r>
+              <a:rPr lang="en-US" sz="1600" dirty="0" smtClean="0">
+                <a:solidFill>
+                  <a:schemeClr val="tx2">
+                    <a:lumMod val="60000"/>
+                    <a:lumOff val="40000"/>
+                  </a:schemeClr>
+                </a:solidFill>
+              </a:rPr>
+              <a:t> </a:t>
+            </a:r>
+            <a:r>
+              <a:rPr lang="en-US" sz="1600" dirty="0" err="1" smtClean="0">
+                <a:solidFill>
+                  <a:schemeClr val="tx2">
+                    <a:lumMod val="60000"/>
+                    <a:lumOff val="40000"/>
+                  </a:schemeClr>
+                </a:solidFill>
+              </a:rPr>
+              <a:t>gettext-devel</a:t>
+            </a:r>
+            <a:r>
+              <a:rPr lang="en-US" sz="1600" dirty="0" smtClean="0">
+                <a:solidFill>
+                  <a:schemeClr val="tx2">
+                    <a:lumMod val="60000"/>
+                    <a:lumOff val="40000"/>
+                  </a:schemeClr>
+                </a:solidFill>
+              </a:rPr>
+              <a:t> </a:t>
+            </a:r>
+            <a:r>
+              <a:rPr lang="en-US" sz="1600" dirty="0" err="1" smtClean="0">
+                <a:solidFill>
+                  <a:schemeClr val="tx2">
+                    <a:lumMod val="60000"/>
+                    <a:lumOff val="40000"/>
+                  </a:schemeClr>
+                </a:solidFill>
+              </a:rPr>
+              <a:t>openssl-devel</a:t>
+            </a:r>
+            <a:r>
+              <a:rPr lang="en-US" sz="1600" dirty="0" smtClean="0">
+                <a:solidFill>
+                  <a:schemeClr val="tx2">
+                    <a:lumMod val="60000"/>
+                    <a:lumOff val="40000"/>
+                  </a:schemeClr>
+                </a:solidFill>
+              </a:rPr>
+              <a:t> </a:t>
+            </a:r>
+            <a:r>
+              <a:rPr lang="en-US" sz="1600" dirty="0" err="1" smtClean="0">
+                <a:solidFill>
+                  <a:schemeClr val="tx2">
+                    <a:lumMod val="60000"/>
+                    <a:lumOff val="40000"/>
+                  </a:schemeClr>
+                </a:solidFill>
+              </a:rPr>
+              <a:t>zlib-devel</a:t>
+            </a:r>
+            <a:r>
+              <a:rPr lang="en-US" sz="1600" dirty="0" smtClean="0">
+                <a:solidFill>
+                  <a:schemeClr val="tx2">
+                    <a:lumMod val="60000"/>
+                    <a:lumOff val="40000"/>
+                  </a:schemeClr>
+                </a:solidFill>
+              </a:rPr>
+              <a:t> </a:t>
+            </a:r>
+            <a:r>
+              <a:rPr lang="en-US" sz="1600" dirty="0" err="1" smtClean="0">
+                <a:solidFill>
+                  <a:schemeClr val="tx2">
+                    <a:lumMod val="60000"/>
+                    <a:lumOff val="40000"/>
+                  </a:schemeClr>
+                </a:solidFill>
+              </a:rPr>
+              <a:t>gcc</a:t>
+            </a:r>
+            <a:r>
+              <a:rPr lang="en-US" sz="1600" dirty="0" smtClean="0">
+                <a:solidFill>
+                  <a:schemeClr val="tx2">
+                    <a:lumMod val="60000"/>
+                    <a:lumOff val="40000"/>
+                  </a:schemeClr>
+                </a:solidFill>
+              </a:rPr>
+              <a:t> </a:t>
+            </a:r>
+            <a:r>
+              <a:rPr lang="en-US" sz="1600" dirty="0" err="1" smtClean="0">
+                <a:solidFill>
+                  <a:schemeClr val="tx2">
+                    <a:lumMod val="60000"/>
+                    <a:lumOff val="40000"/>
+                  </a:schemeClr>
+                </a:solidFill>
+              </a:rPr>
+              <a:t>perl-ExtUtils-MakeMaker</a:t>
+            </a:r>
+            <a:endParaRPr lang="en-US" sz="1600" dirty="0" smtClean="0">
+              <a:solidFill>
+                <a:schemeClr val="tx2">
+                  <a:lumMod val="60000"/>
+                  <a:lumOff val="40000"/>
+                </a:schemeClr>
+              </a:solidFill>
+            </a:endParaRPr>
+          </a:p>
+          <a:p>
+            <a:pPr marL="514350" indent="-514350">
+              <a:buFont typeface="+mj-lt"/>
+              <a:buAutoNum type="arabicPeriod" startAt="2"/>
+            </a:pPr>
+            <a:r>
+              <a:rPr lang="zh-CN" altLang="en-US" sz="1600" dirty="0" smtClean="0"/>
+              <a:t>若存在</a:t>
+            </a:r>
+            <a:r>
+              <a:rPr lang="en-US" altLang="zh-CN" sz="1600" dirty="0" err="1" smtClean="0"/>
+              <a:t>git</a:t>
+            </a:r>
+            <a:r>
+              <a:rPr lang="zh-CN" altLang="en-US" sz="1600" dirty="0" smtClean="0"/>
+              <a:t>，则删除已有的</a:t>
+            </a:r>
+            <a:r>
+              <a:rPr lang="en-US" sz="1600" dirty="0" err="1" smtClean="0"/>
+              <a:t>git</a:t>
+            </a:r>
+            <a:r>
+              <a:rPr lang="zh-CN" altLang="en-US" sz="1600" dirty="0" smtClean="0"/>
+              <a:t>（否则不需要执行该步骤，可使用步骤</a:t>
+            </a:r>
+            <a:r>
+              <a:rPr lang="en-US" altLang="zh-CN" sz="1600" dirty="0" smtClean="0"/>
+              <a:t>4</a:t>
+            </a:r>
+            <a:r>
+              <a:rPr lang="zh-CN" altLang="en-US" sz="1600" dirty="0" smtClean="0"/>
+              <a:t>的命令查看</a:t>
+            </a:r>
+            <a:r>
+              <a:rPr lang="en-US" altLang="zh-CN" sz="1600" dirty="0" smtClean="0"/>
+              <a:t>Linux</a:t>
+            </a:r>
+            <a:r>
+              <a:rPr lang="zh-CN" altLang="en-US" sz="1600" dirty="0" smtClean="0"/>
+              <a:t>系统中是否已有</a:t>
+            </a:r>
+            <a:r>
+              <a:rPr lang="en-US" altLang="zh-CN" sz="1600" dirty="0" err="1" smtClean="0"/>
+              <a:t>git</a:t>
+            </a:r>
+            <a:r>
+              <a:rPr lang="zh-CN" altLang="en-US" sz="1600" dirty="0" smtClean="0"/>
+              <a:t>）</a:t>
+            </a:r>
+            <a:endParaRPr lang="en-US" sz="1600" dirty="0" smtClean="0"/>
+          </a:p>
+          <a:p>
+            <a:pPr marL="514350" indent="-514350"/>
+            <a:r>
+              <a:rPr lang="en-US" altLang="zh-CN" sz="1600" dirty="0" smtClean="0">
+                <a:solidFill>
+                  <a:schemeClr val="tx2">
+                    <a:lumMod val="60000"/>
+                    <a:lumOff val="40000"/>
+                  </a:schemeClr>
+                </a:solidFill>
+              </a:rPr>
+              <a:t>yum remove </a:t>
+            </a:r>
+            <a:r>
+              <a:rPr lang="en-US" altLang="zh-CN" sz="1600" dirty="0" err="1" smtClean="0">
+                <a:solidFill>
+                  <a:schemeClr val="tx2">
+                    <a:lumMod val="60000"/>
+                    <a:lumOff val="40000"/>
+                  </a:schemeClr>
+                </a:solidFill>
+              </a:rPr>
+              <a:t>git</a:t>
+            </a:r>
+            <a:endParaRPr lang="en-US" altLang="zh-CN" sz="1600" dirty="0" smtClean="0">
+              <a:solidFill>
+                <a:schemeClr val="tx2">
+                  <a:lumMod val="60000"/>
+                  <a:lumOff val="40000"/>
+                </a:schemeClr>
+              </a:solidFill>
+            </a:endParaRPr>
+          </a:p>
+          <a:p>
+            <a:pPr marL="514350" indent="-514350">
+              <a:buFont typeface="+mj-lt"/>
+              <a:buAutoNum type="arabicPeriod" startAt="3"/>
+            </a:pPr>
+            <a:r>
+              <a:rPr lang="zh-CN" altLang="en-US" sz="1600" dirty="0" smtClean="0"/>
+              <a:t>安装</a:t>
+            </a:r>
+            <a:r>
+              <a:rPr lang="en-US" altLang="zh-CN" sz="1600" dirty="0" err="1" smtClean="0"/>
+              <a:t>git</a:t>
+            </a:r>
+            <a:r>
+              <a:rPr lang="zh-CN" altLang="en-US" sz="1600" dirty="0" smtClean="0"/>
+              <a:t>（加</a:t>
+            </a:r>
+            <a:r>
+              <a:rPr lang="en-US" altLang="zh-CN" sz="1600" dirty="0" smtClean="0"/>
+              <a:t>-y</a:t>
+            </a:r>
+            <a:r>
+              <a:rPr lang="zh-CN" altLang="en-US" sz="1600" dirty="0" smtClean="0"/>
+              <a:t>可省略安装过程中需要输入</a:t>
+            </a:r>
+            <a:r>
+              <a:rPr lang="en-US" altLang="zh-CN" sz="1600" dirty="0" smtClean="0"/>
+              <a:t>y</a:t>
+            </a:r>
+            <a:r>
+              <a:rPr lang="zh-CN" altLang="en-US" sz="1600" dirty="0" smtClean="0"/>
+              <a:t>的步骤）</a:t>
+            </a:r>
+            <a:endParaRPr lang="en-US" altLang="zh-CN" sz="1600" dirty="0" smtClean="0"/>
+          </a:p>
+          <a:p>
+            <a:pPr marL="514350" indent="-514350"/>
+            <a:r>
+              <a:rPr lang="en-US" altLang="zh-CN" sz="1600" dirty="0" smtClean="0">
+                <a:solidFill>
+                  <a:schemeClr val="tx2">
+                    <a:lumMod val="60000"/>
+                    <a:lumOff val="40000"/>
+                  </a:schemeClr>
+                </a:solidFill>
+              </a:rPr>
+              <a:t>y</a:t>
+            </a:r>
+            <a:r>
+              <a:rPr lang="en-US" sz="1600" dirty="0" smtClean="0">
+                <a:solidFill>
+                  <a:schemeClr val="tx2">
+                    <a:lumMod val="60000"/>
+                    <a:lumOff val="40000"/>
+                  </a:schemeClr>
+                </a:solidFill>
+              </a:rPr>
+              <a:t>um -y install </a:t>
+            </a:r>
+            <a:r>
+              <a:rPr lang="en-US" sz="1600" dirty="0" err="1" smtClean="0">
+                <a:solidFill>
+                  <a:schemeClr val="tx2">
+                    <a:lumMod val="60000"/>
+                    <a:lumOff val="40000"/>
+                  </a:schemeClr>
+                </a:solidFill>
+              </a:rPr>
+              <a:t>git</a:t>
+            </a:r>
+            <a:endParaRPr lang="en-US" sz="1600" dirty="0" smtClean="0">
+              <a:solidFill>
+                <a:schemeClr val="tx2">
+                  <a:lumMod val="60000"/>
+                  <a:lumOff val="40000"/>
+                </a:schemeClr>
+              </a:solidFill>
+            </a:endParaRPr>
+          </a:p>
+          <a:p>
+            <a:pPr marL="514350" indent="-514350">
+              <a:buFont typeface="+mj-lt"/>
+              <a:buAutoNum type="arabicPeriod" startAt="4"/>
+            </a:pPr>
+            <a:r>
+              <a:rPr lang="zh-CN" altLang="en-US" sz="1600" dirty="0" smtClean="0"/>
+              <a:t>安装完成后，查看</a:t>
+            </a:r>
+            <a:r>
+              <a:rPr lang="en-US" altLang="zh-CN" sz="1600" dirty="0" err="1" smtClean="0"/>
+              <a:t>git</a:t>
+            </a:r>
+            <a:r>
+              <a:rPr lang="zh-CN" altLang="en-US" sz="1600" dirty="0" smtClean="0"/>
+              <a:t>版本（若未安装</a:t>
+            </a:r>
+            <a:r>
+              <a:rPr lang="en-US" altLang="zh-CN" sz="1600" dirty="0" err="1" smtClean="0"/>
+              <a:t>git</a:t>
+            </a:r>
+            <a:r>
+              <a:rPr lang="zh-CN" altLang="en-US" sz="1600" dirty="0" smtClean="0"/>
+              <a:t>则提示无</a:t>
+            </a:r>
+            <a:r>
+              <a:rPr lang="en-US" altLang="zh-CN" sz="1600" dirty="0" err="1" smtClean="0"/>
+              <a:t>git</a:t>
+            </a:r>
+            <a:r>
+              <a:rPr lang="zh-CN" altLang="en-US" sz="1600" dirty="0" smtClean="0"/>
+              <a:t>命令）</a:t>
+            </a:r>
+            <a:endParaRPr lang="en-US" altLang="zh-CN" sz="1600" dirty="0" smtClean="0"/>
+          </a:p>
+          <a:p>
+            <a:pPr marL="514350" indent="-514350"/>
+            <a:r>
+              <a:rPr lang="en-US" sz="1600" dirty="0" err="1" smtClean="0">
+                <a:solidFill>
+                  <a:schemeClr val="tx2">
+                    <a:lumMod val="60000"/>
+                    <a:lumOff val="40000"/>
+                  </a:schemeClr>
+                </a:solidFill>
+              </a:rPr>
+              <a:t>git</a:t>
+            </a:r>
+            <a:r>
+              <a:rPr lang="en-US" sz="1600" dirty="0" smtClean="0">
+                <a:solidFill>
+                  <a:schemeClr val="tx2">
+                    <a:lumMod val="60000"/>
+                    <a:lumOff val="40000"/>
+                  </a:schemeClr>
+                </a:solidFill>
+              </a:rPr>
+              <a:t> </a:t>
+            </a:r>
+            <a:r>
+              <a:rPr lang="en-US" altLang="zh-CN" sz="1600" dirty="0" smtClean="0">
+                <a:solidFill>
+                  <a:schemeClr val="tx2">
+                    <a:lumMod val="60000"/>
+                    <a:lumOff val="40000"/>
+                  </a:schemeClr>
+                </a:solidFill>
+              </a:rPr>
+              <a:t>--</a:t>
+            </a:r>
+            <a:r>
+              <a:rPr lang="en-US" sz="1600" dirty="0" smtClean="0">
+                <a:solidFill>
+                  <a:schemeClr val="tx2">
+                    <a:lumMod val="60000"/>
+                    <a:lumOff val="40000"/>
+                  </a:schemeClr>
+                </a:solidFill>
+              </a:rPr>
+              <a:t>version</a:t>
+            </a:r>
+          </a:p>
+          <a:p>
+            <a:pPr marL="514350" indent="-514350">
+              <a:buNone/>
+            </a:pPr>
+            <a:endParaRPr lang="zh-CN" altLang="en-US" sz="1400" dirty="0"/>
+          </a:p>
+        </p:txBody>
+      </p:sp>
+      <p:pic>
+        <p:nvPicPr>
+          <p:cNvPr id="21506" name="Picture 2"/>
+          <p:cNvPicPr>
+            <a:picLocks noChangeAspect="1" noChangeArrowheads="1"/>
+          </p:cNvPicPr>
+          <p:nvPr/>
+        </p:nvPicPr>
+        <p:blipFill>
+          <a:blip r:embed="rId2"/>
+          <a:srcRect/>
+          <a:stretch>
+            <a:fillRect/>
+          </a:stretch>
+        </p:blipFill>
+        <p:spPr bwMode="auto">
+          <a:xfrm>
+            <a:off x="5072066" y="2285992"/>
+            <a:ext cx="3543300" cy="1981200"/>
+          </a:xfrm>
+          <a:prstGeom prst="rect">
+            <a:avLst/>
+          </a:prstGeom>
+          <a:noFill/>
+          <a:ln w="9525">
+            <a:noFill/>
+            <a:miter lim="800000"/>
+            <a:headEnd/>
+            <a:tailEnd/>
+          </a:ln>
+          <a:effectLst/>
+        </p:spPr>
+      </p:pic>
+      <p:pic>
+        <p:nvPicPr>
+          <p:cNvPr id="21507" name="Picture 3"/>
+          <p:cNvPicPr>
+            <a:picLocks noChangeAspect="1" noChangeArrowheads="1"/>
+          </p:cNvPicPr>
+          <p:nvPr/>
+        </p:nvPicPr>
+        <p:blipFill>
+          <a:blip r:embed="rId3"/>
+          <a:srcRect/>
+          <a:stretch>
+            <a:fillRect/>
+          </a:stretch>
+        </p:blipFill>
+        <p:spPr bwMode="auto">
+          <a:xfrm>
+            <a:off x="5072066" y="5286388"/>
+            <a:ext cx="2838450" cy="628650"/>
+          </a:xfrm>
+          <a:prstGeom prst="rect">
+            <a:avLst/>
+          </a:prstGeom>
+          <a:noFill/>
+          <a:ln w="9525">
+            <a:noFill/>
+            <a:miter lim="800000"/>
+            <a:headEnd/>
+            <a:tailEnd/>
+          </a:ln>
+          <a:effectLst/>
+        </p:spPr>
+      </p:pic>
+      <p:sp>
+        <p:nvSpPr>
+          <p:cNvPr id="6" name="TextBox 5"/>
+          <p:cNvSpPr txBox="1"/>
+          <p:nvPr/>
+        </p:nvSpPr>
+        <p:spPr>
+          <a:xfrm>
+            <a:off x="500034" y="6286520"/>
+            <a:ext cx="7215238" cy="307777"/>
+          </a:xfrm>
+          <a:prstGeom prst="rect">
+            <a:avLst/>
+          </a:prstGeom>
+          <a:noFill/>
+        </p:spPr>
+        <p:txBody>
+          <a:bodyPr wrap="square" rtlCol="0">
+            <a:spAutoFit/>
+          </a:bodyPr>
+          <a:lstStyle/>
+          <a:p>
+            <a:r>
+              <a:rPr lang="zh-CN" altLang="en-US" sz="1400" dirty="0" smtClean="0"/>
+              <a:t>注：搭建服务器参考：</a:t>
+            </a:r>
+            <a:r>
+              <a:rPr lang="en-US" altLang="zh-CN" sz="1400" dirty="0" smtClean="0"/>
+              <a:t>https</a:t>
+            </a:r>
+            <a:r>
+              <a:rPr lang="en-US" altLang="zh-CN" sz="1400" dirty="0" smtClean="0"/>
+              <a:t>://www.cnblogs.com/dee0912/p/5815267.html#_label5</a:t>
+            </a:r>
+            <a:endParaRPr lang="zh-CN" altLang="en-US" sz="1400" dirty="0"/>
           </a:p>
         </p:txBody>
       </p:sp>
@@ -18618,34 +19212,1032 @@
           <a:p>
             <a:r>
               <a:rPr lang="zh-CN" altLang="en-US" dirty="0" smtClean="0"/>
-              <a:t>问题汇总</a:t>
+              <a:t>搭建</a:t>
+            </a:r>
+            <a:r>
+              <a:rPr lang="en-US" dirty="0" err="1" smtClean="0"/>
+              <a:t>Git</a:t>
+            </a:r>
+            <a:r>
+              <a:rPr lang="zh-CN" altLang="en-US" dirty="0" smtClean="0"/>
+              <a:t>服务器</a:t>
             </a:r>
             <a:endParaRPr lang="zh-CN" altLang="en-US" dirty="0"/>
           </a:p>
         </p:txBody>
       </p:sp>
-      <p:graphicFrame>
-        <p:nvGraphicFramePr>
-          <p:cNvPr id="6" name="对象 5">
-            <a:hlinkClick r:id="rId3" action="ppaction://hlinkfile"/>
-          </p:cNvPr>
-          <p:cNvGraphicFramePr>
-            <a:graphicFrameLocks noChangeAspect="1"/>
-          </p:cNvGraphicFramePr>
+      <p:sp>
+        <p:nvSpPr>
+          <p:cNvPr id="3" name="内容占位符 2"/>
+          <p:cNvSpPr>
+            <a:spLocks noGrp="1"/>
+          </p:cNvSpPr>
+          <p:nvPr>
+            <p:ph idx="1"/>
+          </p:nvPr>
+        </p:nvSpPr>
+        <p:spPr>
+          <a:xfrm>
+            <a:off x="457200" y="1714488"/>
+            <a:ext cx="4186238" cy="4411675"/>
+          </a:xfrm>
+        </p:spPr>
+        <p:txBody>
+          <a:bodyPr>
+            <a:normAutofit/>
+          </a:bodyPr>
+          <a:lstStyle/>
+          <a:p>
+            <a:pPr marL="514350" indent="-514350">
+              <a:buFont typeface="Wingdings" pitchFamily="2" charset="2"/>
+              <a:buChar char="Ø"/>
+            </a:pPr>
+            <a:r>
+              <a:rPr lang="zh-CN" altLang="en-US" sz="2400" dirty="0" smtClean="0"/>
+              <a:t>创建用户来管理</a:t>
+            </a:r>
+            <a:r>
+              <a:rPr lang="en-US" altLang="zh-CN" sz="2400" dirty="0" err="1" smtClean="0"/>
+              <a:t>Git</a:t>
+            </a:r>
+            <a:r>
+              <a:rPr lang="zh-CN" altLang="en-US" sz="2400" dirty="0" smtClean="0"/>
+              <a:t>服务</a:t>
+            </a:r>
+            <a:endParaRPr lang="en-US" sz="2400" dirty="0" smtClean="0"/>
+          </a:p>
+          <a:p>
+            <a:pPr marL="514350" indent="-514350">
+              <a:buFont typeface="+mj-lt"/>
+              <a:buAutoNum type="arabicPeriod"/>
+            </a:pPr>
+            <a:r>
+              <a:rPr lang="zh-CN" altLang="en-US" sz="1700" dirty="0" smtClean="0"/>
+              <a:t>使用</a:t>
+            </a:r>
+            <a:r>
+              <a:rPr lang="en-US" altLang="zh-CN" sz="1700" dirty="0" smtClean="0">
+                <a:solidFill>
+                  <a:schemeClr val="tx2">
+                    <a:lumMod val="60000"/>
+                    <a:lumOff val="40000"/>
+                  </a:schemeClr>
+                </a:solidFill>
+              </a:rPr>
+              <a:t>id </a:t>
+            </a:r>
+            <a:r>
+              <a:rPr lang="zh-CN" altLang="en-US" sz="1700" dirty="0" smtClean="0">
+                <a:solidFill>
+                  <a:schemeClr val="tx2">
+                    <a:lumMod val="60000"/>
+                    <a:lumOff val="40000"/>
+                  </a:schemeClr>
+                </a:solidFill>
+              </a:rPr>
+              <a:t>用户名</a:t>
+            </a:r>
+            <a:r>
+              <a:rPr lang="zh-CN" altLang="en-US" sz="1700" dirty="0" smtClean="0"/>
+              <a:t>（如：</a:t>
+            </a:r>
+            <a:r>
+              <a:rPr lang="en-US" altLang="zh-CN" sz="1700" dirty="0" smtClean="0"/>
+              <a:t>id </a:t>
+            </a:r>
+            <a:r>
+              <a:rPr lang="en-US" altLang="zh-CN" sz="1700" dirty="0" err="1" smtClean="0"/>
+              <a:t>gitadmin</a:t>
+            </a:r>
+            <a:r>
+              <a:rPr lang="zh-CN" altLang="en-US" sz="1700" dirty="0" smtClean="0"/>
+              <a:t>）查看</a:t>
+            </a:r>
+            <a:r>
+              <a:rPr lang="en-US" altLang="zh-CN" sz="1700" dirty="0" smtClean="0"/>
+              <a:t>Linux</a:t>
+            </a:r>
+            <a:r>
+              <a:rPr lang="zh-CN" altLang="en-US" sz="1700" dirty="0" smtClean="0"/>
+              <a:t>系统中是否已存在相应用户；</a:t>
+            </a:r>
+            <a:endParaRPr lang="en-US" altLang="zh-CN" sz="1700" dirty="0" smtClean="0"/>
+          </a:p>
+          <a:p>
+            <a:pPr marL="514350" indent="-514350">
+              <a:buFont typeface="+mj-lt"/>
+              <a:buAutoNum type="arabicPeriod"/>
+            </a:pPr>
+            <a:endParaRPr lang="en-US" altLang="zh-CN" sz="1700" dirty="0" smtClean="0"/>
+          </a:p>
+          <a:p>
+            <a:pPr marL="514350" indent="-514350">
+              <a:buFont typeface="+mj-lt"/>
+              <a:buAutoNum type="arabicPeriod"/>
+            </a:pPr>
+            <a:r>
+              <a:rPr lang="zh-CN" altLang="en-US" sz="1700" dirty="0" smtClean="0"/>
+              <a:t>没有则使用</a:t>
+            </a:r>
+            <a:r>
+              <a:rPr lang="en-US" altLang="zh-CN" sz="1700" dirty="0" err="1" smtClean="0">
+                <a:solidFill>
+                  <a:schemeClr val="tx2">
+                    <a:lumMod val="60000"/>
+                    <a:lumOff val="40000"/>
+                  </a:schemeClr>
+                </a:solidFill>
+              </a:rPr>
+              <a:t>useradd</a:t>
+            </a:r>
+            <a:r>
+              <a:rPr lang="en-US" altLang="zh-CN" sz="1700" dirty="0" smtClean="0">
+                <a:solidFill>
+                  <a:schemeClr val="tx2">
+                    <a:lumMod val="60000"/>
+                    <a:lumOff val="40000"/>
+                  </a:schemeClr>
+                </a:solidFill>
+              </a:rPr>
+              <a:t> </a:t>
+            </a:r>
+            <a:r>
+              <a:rPr lang="zh-CN" altLang="en-US" sz="1700" dirty="0" smtClean="0">
+                <a:solidFill>
+                  <a:schemeClr val="tx2">
+                    <a:lumMod val="60000"/>
+                    <a:lumOff val="40000"/>
+                  </a:schemeClr>
+                </a:solidFill>
+              </a:rPr>
+              <a:t>用户名</a:t>
+            </a:r>
+            <a:r>
+              <a:rPr lang="zh-CN" altLang="en-US" sz="1700" dirty="0" smtClean="0"/>
+              <a:t>（如：</a:t>
+            </a:r>
+            <a:r>
+              <a:rPr lang="en-US" altLang="zh-CN" sz="1700" dirty="0" err="1" smtClean="0"/>
+              <a:t>useradd</a:t>
+            </a:r>
+            <a:r>
+              <a:rPr lang="en-US" altLang="zh-CN" sz="1700" dirty="0" smtClean="0"/>
+              <a:t> </a:t>
+            </a:r>
+            <a:r>
+              <a:rPr lang="en-US" altLang="zh-CN" sz="1700" dirty="0" err="1" smtClean="0"/>
+              <a:t>gitadmin</a:t>
+            </a:r>
+            <a:r>
+              <a:rPr lang="zh-CN" altLang="en-US" sz="1700" dirty="0" smtClean="0"/>
+              <a:t>）添加新用户；</a:t>
+            </a:r>
+            <a:endParaRPr lang="en-US" altLang="zh-CN" sz="1700" dirty="0" smtClean="0"/>
+          </a:p>
+          <a:p>
+            <a:pPr marL="514350" indent="-514350">
+              <a:buFont typeface="+mj-lt"/>
+              <a:buAutoNum type="arabicPeriod"/>
+            </a:pPr>
+            <a:endParaRPr lang="en-US" altLang="zh-CN" sz="1700" dirty="0" smtClean="0"/>
+          </a:p>
+          <a:p>
+            <a:pPr marL="514350" indent="-514350">
+              <a:buFont typeface="+mj-lt"/>
+              <a:buAutoNum type="arabicPeriod"/>
+            </a:pPr>
+            <a:r>
+              <a:rPr lang="zh-CN" altLang="en-US" sz="1700" dirty="0" smtClean="0"/>
+              <a:t>使用</a:t>
+            </a:r>
+            <a:r>
+              <a:rPr lang="en-US" altLang="zh-CN" sz="1700" dirty="0" err="1" smtClean="0">
+                <a:solidFill>
+                  <a:schemeClr val="tx2">
+                    <a:lumMod val="60000"/>
+                    <a:lumOff val="40000"/>
+                  </a:schemeClr>
+                </a:solidFill>
+              </a:rPr>
+              <a:t>passwd</a:t>
+            </a:r>
+            <a:r>
+              <a:rPr lang="en-US" altLang="zh-CN" sz="1700" dirty="0" smtClean="0">
+                <a:solidFill>
+                  <a:schemeClr val="tx2">
+                    <a:lumMod val="60000"/>
+                    <a:lumOff val="40000"/>
+                  </a:schemeClr>
+                </a:solidFill>
+              </a:rPr>
+              <a:t> </a:t>
+            </a:r>
+            <a:r>
+              <a:rPr lang="zh-CN" altLang="en-US" sz="1700" dirty="0" smtClean="0">
+                <a:solidFill>
+                  <a:schemeClr val="tx2">
+                    <a:lumMod val="60000"/>
+                    <a:lumOff val="40000"/>
+                  </a:schemeClr>
+                </a:solidFill>
+              </a:rPr>
+              <a:t>用户名</a:t>
+            </a:r>
+            <a:r>
+              <a:rPr lang="zh-CN" altLang="en-US" sz="1700" dirty="0" smtClean="0"/>
+              <a:t>（如：</a:t>
+            </a:r>
+            <a:r>
+              <a:rPr lang="en-US" altLang="zh-CN" sz="1700" dirty="0" err="1" smtClean="0"/>
+              <a:t>passwd</a:t>
+            </a:r>
+            <a:r>
+              <a:rPr lang="en-US" altLang="zh-CN" sz="1700" dirty="0" smtClean="0"/>
+              <a:t> </a:t>
+            </a:r>
+            <a:r>
+              <a:rPr lang="en-US" altLang="zh-CN" sz="1700" dirty="0" err="1" smtClean="0"/>
+              <a:t>gitadmin</a:t>
+            </a:r>
+            <a:r>
+              <a:rPr lang="zh-CN" altLang="en-US" sz="1700" dirty="0" smtClean="0"/>
+              <a:t>）给该用户添加密码（输入密码后直接按回车键，输入过程中界面不显示输入的密码）。</a:t>
+            </a:r>
+            <a:endParaRPr lang="zh-CN" altLang="en-US" sz="1700" dirty="0"/>
+          </a:p>
+        </p:txBody>
+      </p:sp>
+      <p:pic>
+        <p:nvPicPr>
+          <p:cNvPr id="22531" name="Picture 3"/>
+          <p:cNvPicPr>
+            <a:picLocks noChangeAspect="1" noChangeArrowheads="1"/>
+          </p:cNvPicPr>
           <p:nvPr/>
-        </p:nvGraphicFramePr>
-        <p:xfrm>
-          <a:off x="1714480" y="2143116"/>
-          <a:ext cx="914400" cy="828675"/>
-        </p:xfrm>
-        <a:graphic>
-          <a:graphicData uri="http://schemas.openxmlformats.org/presentationml/2006/ole">
-            <p:oleObj spid="_x0000_s8197" name="文档" showAsIcon="1" r:id="rId4" imgW="914400" imgH="828720" progId="Word.Document.12">
-              <p:link updateAutomatic="1"/>
-            </p:oleObj>
-          </a:graphicData>
-        </a:graphic>
-      </p:graphicFrame>
+        </p:nvPicPr>
+        <p:blipFill>
+          <a:blip r:embed="rId2"/>
+          <a:srcRect/>
+          <a:stretch>
+            <a:fillRect/>
+          </a:stretch>
+        </p:blipFill>
+        <p:spPr bwMode="auto">
+          <a:xfrm>
+            <a:off x="4786314" y="2285992"/>
+            <a:ext cx="4124325" cy="2162175"/>
+          </a:xfrm>
+          <a:prstGeom prst="rect">
+            <a:avLst/>
+          </a:prstGeom>
+          <a:noFill/>
+          <a:ln w="9525">
+            <a:noFill/>
+            <a:miter lim="800000"/>
+            <a:headEnd/>
+            <a:tailEnd/>
+          </a:ln>
+          <a:effectLst/>
+        </p:spPr>
+      </p:pic>
+    </p:spTree>
+  </p:cSld>
+  <p:clrMapOvr>
+    <a:masterClrMapping/>
+  </p:clrMapOvr>
+</p:sld>
+</file>
+
+<file path=ppt/slides/slide49.xml><?xml version="1.0" encoding="utf-8"?>
+<p:sld xmlns:a="http://schemas.openxmlformats.org/drawingml/2006/main" xmlns:r="http://schemas.openxmlformats.org/officeDocument/2006/relationships" xmlns:p="http://schemas.openxmlformats.org/presentationml/2006/main">
+  <p:cSld>
+    <p:spTree>
+      <p:nvGrpSpPr>
+        <p:cNvPr id="1" name=""/>
+        <p:cNvGrpSpPr/>
+        <p:nvPr/>
+      </p:nvGrpSpPr>
+      <p:grpSpPr>
+        <a:xfrm>
+          <a:off x="0" y="0"/>
+          <a:ext cx="0" cy="0"/>
+          <a:chOff x="0" y="0"/>
+          <a:chExt cx="0" cy="0"/>
+        </a:xfrm>
+      </p:grpSpPr>
+      <p:sp>
+        <p:nvSpPr>
+          <p:cNvPr id="2" name="标题 1"/>
+          <p:cNvSpPr>
+            <a:spLocks noGrp="1"/>
+          </p:cNvSpPr>
+          <p:nvPr>
+            <p:ph type="title"/>
+          </p:nvPr>
+        </p:nvSpPr>
+        <p:spPr/>
+        <p:txBody>
+          <a:bodyPr/>
+          <a:lstStyle/>
+          <a:p>
+            <a:r>
+              <a:rPr lang="zh-CN" altLang="en-US" dirty="0" smtClean="0"/>
+              <a:t>搭建</a:t>
+            </a:r>
+            <a:r>
+              <a:rPr lang="en-US" dirty="0" err="1" smtClean="0"/>
+              <a:t>Git</a:t>
+            </a:r>
+            <a:r>
+              <a:rPr lang="zh-CN" altLang="en-US" dirty="0" smtClean="0"/>
+              <a:t>服务器</a:t>
+            </a:r>
+            <a:endParaRPr lang="zh-CN" altLang="en-US" dirty="0"/>
+          </a:p>
+        </p:txBody>
+      </p:sp>
+      <p:sp>
+        <p:nvSpPr>
+          <p:cNvPr id="3" name="内容占位符 2"/>
+          <p:cNvSpPr>
+            <a:spLocks noGrp="1"/>
+          </p:cNvSpPr>
+          <p:nvPr>
+            <p:ph idx="1"/>
+          </p:nvPr>
+        </p:nvSpPr>
+        <p:spPr>
+          <a:xfrm>
+            <a:off x="457200" y="1285861"/>
+            <a:ext cx="8258204" cy="5000659"/>
+          </a:xfrm>
+        </p:spPr>
+        <p:txBody>
+          <a:bodyPr>
+            <a:normAutofit/>
+          </a:bodyPr>
+          <a:lstStyle/>
+          <a:p>
+            <a:pPr>
+              <a:buFont typeface="Wingdings" pitchFamily="2" charset="2"/>
+              <a:buChar char="Ø"/>
+            </a:pPr>
+            <a:r>
+              <a:rPr lang="zh-CN" altLang="en-US" sz="2400" dirty="0" smtClean="0"/>
+              <a:t>服务端创建</a:t>
+            </a:r>
+            <a:r>
+              <a:rPr lang="en-US" altLang="zh-CN" sz="2400" dirty="0" err="1" smtClean="0"/>
+              <a:t>Git</a:t>
+            </a:r>
+            <a:r>
+              <a:rPr lang="zh-CN" altLang="en-US" sz="2400" dirty="0" smtClean="0"/>
+              <a:t>仓库</a:t>
+            </a:r>
+            <a:endParaRPr lang="en-US" altLang="zh-CN" sz="2400" dirty="0" smtClean="0"/>
+          </a:p>
+          <a:p>
+            <a:pPr marL="514350" indent="-514350">
+              <a:buFont typeface="+mj-lt"/>
+              <a:buAutoNum type="arabicPeriod"/>
+            </a:pPr>
+            <a:r>
+              <a:rPr lang="zh-CN" altLang="en-US" sz="1400" dirty="0" smtClean="0"/>
+              <a:t>创建</a:t>
+            </a:r>
+            <a:r>
+              <a:rPr lang="en-US" altLang="zh-CN" sz="1400" dirty="0" err="1" smtClean="0"/>
+              <a:t>Git</a:t>
+            </a:r>
+            <a:r>
+              <a:rPr lang="zh-CN" altLang="en-US" sz="1400" dirty="0" smtClean="0"/>
+              <a:t>仓库文件夹</a:t>
+            </a:r>
+            <a:endParaRPr lang="en-US" altLang="zh-CN" sz="1400" dirty="0" smtClean="0"/>
+          </a:p>
+          <a:p>
+            <a:pPr marL="514350" indent="-514350">
+              <a:buNone/>
+            </a:pPr>
+            <a:r>
+              <a:rPr lang="en-US" altLang="zh-CN" sz="1400" dirty="0" smtClean="0"/>
+              <a:t>	</a:t>
+            </a:r>
+            <a:r>
+              <a:rPr lang="en-US" altLang="zh-CN" sz="1400" dirty="0" err="1" smtClean="0">
+                <a:solidFill>
+                  <a:schemeClr val="tx2">
+                    <a:lumMod val="60000"/>
+                    <a:lumOff val="40000"/>
+                  </a:schemeClr>
+                </a:solidFill>
+              </a:rPr>
+              <a:t>mkdir</a:t>
+            </a:r>
+            <a:r>
+              <a:rPr lang="en-US" altLang="zh-CN" sz="1400" dirty="0" smtClean="0">
+                <a:solidFill>
+                  <a:schemeClr val="tx2">
+                    <a:lumMod val="60000"/>
+                    <a:lumOff val="40000"/>
+                  </a:schemeClr>
+                </a:solidFill>
+              </a:rPr>
+              <a:t> -p </a:t>
+            </a:r>
+            <a:r>
+              <a:rPr lang="zh-CN" altLang="en-US" sz="1400" dirty="0" smtClean="0">
+                <a:solidFill>
+                  <a:schemeClr val="tx2">
+                    <a:lumMod val="60000"/>
+                    <a:lumOff val="40000"/>
+                  </a:schemeClr>
+                </a:solidFill>
+              </a:rPr>
+              <a:t>路径</a:t>
+            </a:r>
+            <a:r>
+              <a:rPr lang="en-US" altLang="zh-CN" sz="1400" dirty="0" smtClean="0">
+                <a:solidFill>
+                  <a:schemeClr val="tx2">
+                    <a:lumMod val="60000"/>
+                    <a:lumOff val="40000"/>
+                  </a:schemeClr>
+                </a:solidFill>
+              </a:rPr>
+              <a:t>/</a:t>
+            </a:r>
+            <a:r>
+              <a:rPr lang="zh-CN" altLang="en-US" sz="1400" dirty="0" smtClean="0">
+                <a:solidFill>
+                  <a:schemeClr val="tx2">
+                    <a:lumMod val="60000"/>
+                    <a:lumOff val="40000"/>
+                  </a:schemeClr>
+                </a:solidFill>
+              </a:rPr>
+              <a:t>文件夹名</a:t>
+            </a:r>
+            <a:r>
+              <a:rPr lang="zh-CN" altLang="en-US" sz="1400" dirty="0" smtClean="0"/>
+              <a:t>（如：</a:t>
+            </a:r>
+            <a:r>
+              <a:rPr lang="en-US" altLang="zh-CN" sz="1400" dirty="0" err="1" smtClean="0"/>
+              <a:t>mkdir</a:t>
+            </a:r>
+            <a:r>
+              <a:rPr lang="en-US" altLang="zh-CN" sz="1400" dirty="0" smtClean="0"/>
+              <a:t> -p /home/</a:t>
+            </a:r>
+            <a:r>
+              <a:rPr lang="en-US" altLang="zh-CN" sz="1400" dirty="0" err="1" smtClean="0"/>
+              <a:t>gitrepo</a:t>
+            </a:r>
+            <a:r>
+              <a:rPr lang="en-US" altLang="zh-CN" sz="1400" dirty="0" smtClean="0"/>
+              <a:t>/learngit.git</a:t>
+            </a:r>
+            <a:r>
+              <a:rPr lang="zh-CN" altLang="en-US" sz="1400" dirty="0" smtClean="0"/>
+              <a:t>）</a:t>
+            </a:r>
+            <a:endParaRPr lang="en-US" altLang="zh-CN" sz="1400" dirty="0" smtClean="0"/>
+          </a:p>
+          <a:p>
+            <a:pPr marL="514350" indent="-514350">
+              <a:buNone/>
+            </a:pPr>
+            <a:r>
+              <a:rPr lang="en-US" altLang="zh-CN" sz="1400" dirty="0" smtClean="0"/>
+              <a:t>	</a:t>
+            </a:r>
+            <a:r>
+              <a:rPr lang="zh-CN" altLang="en-US" sz="1400" dirty="0" smtClean="0"/>
+              <a:t>（</a:t>
+            </a:r>
+            <a:r>
+              <a:rPr lang="en-US" altLang="zh-CN" sz="1400" dirty="0" smtClean="0"/>
+              <a:t>-p</a:t>
+            </a:r>
+            <a:r>
+              <a:rPr lang="zh-CN" altLang="en-US" sz="1400" dirty="0" smtClean="0"/>
+              <a:t>作用：若路径中的某些目录尚不存在，加上此选项后，系统将自动建立好那些尚不存在的目录，即一次可以建立多个目录）</a:t>
+            </a:r>
+            <a:endParaRPr lang="en-US" altLang="zh-CN" sz="1400" dirty="0" smtClean="0"/>
+          </a:p>
+          <a:p>
+            <a:pPr marL="514350" indent="-514350">
+              <a:buFont typeface="+mj-lt"/>
+              <a:buAutoNum type="arabicPeriod" startAt="2"/>
+            </a:pPr>
+            <a:r>
+              <a:rPr lang="zh-CN" altLang="en-US" sz="1400" dirty="0" smtClean="0"/>
+              <a:t>将创建的文件夹变为</a:t>
+            </a:r>
+            <a:r>
+              <a:rPr lang="en-US" altLang="zh-CN" sz="1400" dirty="0" err="1" smtClean="0"/>
+              <a:t>Git</a:t>
+            </a:r>
+            <a:r>
+              <a:rPr lang="zh-CN" altLang="en-US" sz="1400" dirty="0" smtClean="0"/>
+              <a:t>仓库</a:t>
+            </a:r>
+            <a:endParaRPr lang="en-US" altLang="zh-CN" sz="1400" dirty="0" smtClean="0"/>
+          </a:p>
+          <a:p>
+            <a:pPr marL="514350" indent="-514350">
+              <a:buNone/>
+            </a:pPr>
+            <a:r>
+              <a:rPr lang="en-US" altLang="zh-CN" sz="1400" dirty="0" smtClean="0"/>
+              <a:t>	</a:t>
+            </a:r>
+            <a:r>
+              <a:rPr lang="en-US" altLang="zh-CN" sz="1400" dirty="0" smtClean="0">
+                <a:solidFill>
+                  <a:schemeClr val="tx2">
+                    <a:lumMod val="60000"/>
+                    <a:lumOff val="40000"/>
+                  </a:schemeClr>
+                </a:solidFill>
+              </a:rPr>
+              <a:t> </a:t>
+            </a:r>
+            <a:r>
+              <a:rPr lang="en-US" altLang="zh-CN" sz="1400" dirty="0" err="1" smtClean="0">
+                <a:solidFill>
+                  <a:schemeClr val="tx2">
+                    <a:lumMod val="60000"/>
+                    <a:lumOff val="40000"/>
+                  </a:schemeClr>
+                </a:solidFill>
+              </a:rPr>
+              <a:t>git</a:t>
+            </a:r>
+            <a:r>
+              <a:rPr lang="en-US" altLang="zh-CN" sz="1400" dirty="0" smtClean="0">
+                <a:solidFill>
+                  <a:schemeClr val="tx2">
+                    <a:lumMod val="60000"/>
+                    <a:lumOff val="40000"/>
+                  </a:schemeClr>
+                </a:solidFill>
+              </a:rPr>
+              <a:t> init --bare </a:t>
+            </a:r>
+            <a:r>
+              <a:rPr lang="en-US" altLang="zh-CN" sz="1400" dirty="0" err="1" smtClean="0">
+                <a:solidFill>
+                  <a:schemeClr val="tx2">
+                    <a:lumMod val="60000"/>
+                    <a:lumOff val="40000"/>
+                  </a:schemeClr>
+                </a:solidFill>
+              </a:rPr>
+              <a:t>Git</a:t>
+            </a:r>
+            <a:r>
+              <a:rPr lang="zh-CN" altLang="en-US" sz="1400" dirty="0" smtClean="0">
+                <a:solidFill>
+                  <a:schemeClr val="tx2">
+                    <a:lumMod val="60000"/>
+                    <a:lumOff val="40000"/>
+                  </a:schemeClr>
+                </a:solidFill>
+              </a:rPr>
+              <a:t>仓库文件夹</a:t>
+            </a:r>
+            <a:r>
+              <a:rPr lang="zh-CN" altLang="en-US" sz="1400" dirty="0" smtClean="0"/>
+              <a:t>（如：</a:t>
+            </a:r>
+            <a:r>
+              <a:rPr lang="en-US" altLang="zh-CN" sz="1400" dirty="0" smtClean="0"/>
+              <a:t> </a:t>
+            </a:r>
+            <a:r>
+              <a:rPr lang="en-US" altLang="zh-CN" sz="1400" dirty="0" err="1" smtClean="0"/>
+              <a:t>git</a:t>
+            </a:r>
+            <a:r>
+              <a:rPr lang="en-US" altLang="zh-CN" sz="1400" dirty="0" smtClean="0"/>
+              <a:t> init --bare /home/</a:t>
+            </a:r>
+            <a:r>
+              <a:rPr lang="en-US" altLang="zh-CN" sz="1400" dirty="0" err="1" smtClean="0"/>
+              <a:t>gitrepo</a:t>
+            </a:r>
+            <a:r>
+              <a:rPr lang="en-US" altLang="zh-CN" sz="1400" dirty="0" smtClean="0"/>
+              <a:t>/learngit.git </a:t>
+            </a:r>
+            <a:r>
+              <a:rPr lang="zh-CN" altLang="en-US" sz="1400" dirty="0" smtClean="0"/>
+              <a:t>）</a:t>
+            </a:r>
+            <a:endParaRPr lang="en-US" altLang="zh-CN" sz="1400" dirty="0" smtClean="0"/>
+          </a:p>
+          <a:p>
+            <a:pPr marL="514350" indent="-514350">
+              <a:buNone/>
+            </a:pPr>
+            <a:r>
+              <a:rPr lang="en-US" altLang="zh-CN" sz="1400" dirty="0" smtClean="0"/>
+              <a:t>	</a:t>
+            </a:r>
+            <a:r>
+              <a:rPr lang="zh-CN" altLang="en-US" sz="1400" dirty="0" smtClean="0"/>
+              <a:t>（或分两步：</a:t>
+            </a:r>
+            <a:r>
+              <a:rPr lang="en-US" altLang="zh-CN" sz="1400" dirty="0" err="1" smtClean="0"/>
+              <a:t>cd</a:t>
+            </a:r>
+            <a:r>
+              <a:rPr lang="en-US" altLang="zh-CN" sz="1400" dirty="0" smtClean="0"/>
+              <a:t> /home/</a:t>
+            </a:r>
+            <a:r>
+              <a:rPr lang="en-US" altLang="zh-CN" sz="1400" dirty="0" err="1" smtClean="0"/>
+              <a:t>gitrepo</a:t>
+            </a:r>
+            <a:r>
+              <a:rPr lang="en-US" altLang="zh-CN" sz="1400" dirty="0" smtClean="0"/>
+              <a:t>/learngit.git	</a:t>
+            </a:r>
+            <a:r>
+              <a:rPr lang="en-US" altLang="zh-CN" sz="1400" dirty="0" err="1" smtClean="0"/>
+              <a:t>git</a:t>
+            </a:r>
+            <a:r>
+              <a:rPr lang="en-US" altLang="zh-CN" sz="1400" dirty="0" smtClean="0"/>
+              <a:t> init --bare .</a:t>
+            </a:r>
+            <a:r>
+              <a:rPr lang="zh-CN" altLang="en-US" sz="1400" dirty="0" smtClean="0"/>
+              <a:t>）</a:t>
+            </a:r>
+            <a:endParaRPr lang="en-US" altLang="zh-CN" sz="1400" dirty="0" smtClean="0"/>
+          </a:p>
+          <a:p>
+            <a:pPr marL="514350" indent="-514350">
+              <a:buNone/>
+            </a:pPr>
+            <a:r>
+              <a:rPr lang="en-US" altLang="zh-CN" sz="1400" dirty="0" smtClean="0">
+                <a:solidFill>
+                  <a:schemeClr val="tx2">
+                    <a:lumMod val="60000"/>
+                    <a:lumOff val="40000"/>
+                  </a:schemeClr>
+                </a:solidFill>
+              </a:rPr>
+              <a:t>	</a:t>
+            </a:r>
+            <a:r>
+              <a:rPr lang="zh-CN" altLang="en-US" sz="1400" dirty="0" smtClean="0"/>
+              <a:t>（</a:t>
+            </a:r>
+            <a:r>
+              <a:rPr lang="en-US" altLang="zh-CN" sz="1400" dirty="0" smtClean="0"/>
+              <a:t> --bare</a:t>
+            </a:r>
+            <a:r>
+              <a:rPr lang="zh-CN" altLang="en-US" sz="1400" dirty="0" smtClean="0"/>
+              <a:t>作用： 创建一个“裸库”，在该库中没有类似于本地库那样的文件结构可供直接进行浏览和修改，即没有类似本地库的工作区。一般作为远端备份或公共版本库时，应该使用</a:t>
+            </a:r>
+            <a:r>
+              <a:rPr lang="en-US" altLang="zh-CN" sz="1400" dirty="0" err="1" smtClean="0"/>
+              <a:t>git</a:t>
+            </a:r>
+            <a:r>
+              <a:rPr lang="en-US" altLang="zh-CN" sz="1400" dirty="0" smtClean="0"/>
+              <a:t> init --bare </a:t>
+            </a:r>
+            <a:r>
+              <a:rPr lang="zh-CN" altLang="en-US" sz="1400" dirty="0" smtClean="0"/>
+              <a:t>）</a:t>
+            </a:r>
+            <a:endParaRPr lang="en-US" altLang="zh-CN" sz="1400" dirty="0" smtClean="0"/>
+          </a:p>
+          <a:p>
+            <a:pPr marL="514350" indent="-514350">
+              <a:buNone/>
+            </a:pPr>
+            <a:endParaRPr lang="en-US" altLang="zh-CN" sz="1400" dirty="0" smtClean="0"/>
+          </a:p>
+          <a:p>
+            <a:pPr marL="514350" indent="-514350">
+              <a:buNone/>
+            </a:pPr>
+            <a:endParaRPr lang="en-US" altLang="zh-CN" sz="1400" dirty="0" smtClean="0"/>
+          </a:p>
+          <a:p>
+            <a:pPr marL="514350" indent="-514350">
+              <a:buNone/>
+            </a:pPr>
+            <a:endParaRPr lang="en-US" altLang="zh-CN" sz="1400" dirty="0" smtClean="0"/>
+          </a:p>
+          <a:p>
+            <a:pPr marL="514350" indent="-514350">
+              <a:buFont typeface="+mj-lt"/>
+              <a:buAutoNum type="arabicPeriod" startAt="3"/>
+            </a:pPr>
+            <a:r>
+              <a:rPr lang="zh-CN" altLang="en-US" sz="1400" dirty="0" smtClean="0"/>
+              <a:t>把 </a:t>
+            </a:r>
+            <a:r>
+              <a:rPr lang="en-US" sz="1400" dirty="0" err="1" smtClean="0"/>
+              <a:t>Git</a:t>
+            </a:r>
+            <a:r>
+              <a:rPr lang="en-US" sz="1400" dirty="0" smtClean="0"/>
+              <a:t> </a:t>
+            </a:r>
+            <a:r>
+              <a:rPr lang="zh-CN" altLang="en-US" sz="1400" dirty="0" smtClean="0"/>
+              <a:t>仓库的拥有者修改为 </a:t>
+            </a:r>
+            <a:r>
+              <a:rPr lang="en-US" sz="1400" dirty="0" err="1" smtClean="0"/>
+              <a:t>gitadmin</a:t>
+            </a:r>
+            <a:endParaRPr lang="en-US" sz="1400" dirty="0" smtClean="0"/>
+          </a:p>
+          <a:p>
+            <a:pPr marL="514350" indent="-514350">
+              <a:buFont typeface="+mj-lt"/>
+              <a:buAutoNum type="alphaLcParenR"/>
+            </a:pPr>
+            <a:r>
+              <a:rPr lang="zh-CN" altLang="en-US" sz="1400" dirty="0" smtClean="0"/>
+              <a:t>进入到</a:t>
+            </a:r>
+            <a:r>
+              <a:rPr lang="en-US" altLang="zh-CN" sz="1400" dirty="0" err="1" smtClean="0"/>
+              <a:t>Git</a:t>
+            </a:r>
+            <a:r>
+              <a:rPr lang="zh-CN" altLang="en-US" sz="1400" dirty="0" smtClean="0"/>
+              <a:t>仓库所在目录：</a:t>
+            </a:r>
+            <a:r>
+              <a:rPr lang="en-US" altLang="zh-CN" sz="1400" dirty="0" err="1" smtClean="0">
+                <a:solidFill>
+                  <a:schemeClr val="tx2">
+                    <a:lumMod val="60000"/>
+                    <a:lumOff val="40000"/>
+                  </a:schemeClr>
+                </a:solidFill>
+              </a:rPr>
+              <a:t>cd</a:t>
+            </a:r>
+            <a:r>
+              <a:rPr lang="en-US" altLang="zh-CN" sz="1400" dirty="0" smtClean="0">
+                <a:solidFill>
+                  <a:schemeClr val="tx2">
+                    <a:lumMod val="60000"/>
+                    <a:lumOff val="40000"/>
+                  </a:schemeClr>
+                </a:solidFill>
+              </a:rPr>
+              <a:t> /home/</a:t>
+            </a:r>
+            <a:r>
+              <a:rPr lang="en-US" altLang="zh-CN" sz="1400" dirty="0" err="1" smtClean="0">
+                <a:solidFill>
+                  <a:schemeClr val="tx2">
+                    <a:lumMod val="60000"/>
+                    <a:lumOff val="40000"/>
+                  </a:schemeClr>
+                </a:solidFill>
+              </a:rPr>
+              <a:t>gitrepo</a:t>
+            </a:r>
+            <a:endParaRPr lang="en-US" altLang="zh-CN" sz="1400" dirty="0" smtClean="0">
+              <a:solidFill>
+                <a:schemeClr val="tx2">
+                  <a:lumMod val="60000"/>
+                  <a:lumOff val="40000"/>
+                </a:schemeClr>
+              </a:solidFill>
+            </a:endParaRPr>
+          </a:p>
+          <a:p>
+            <a:pPr marL="514350" indent="-514350">
+              <a:buFont typeface="+mj-lt"/>
+              <a:buAutoNum type="alphaLcParenR"/>
+            </a:pPr>
+            <a:r>
+              <a:rPr lang="zh-CN" altLang="en-US" sz="1400" dirty="0" smtClean="0"/>
+              <a:t>改变文件的拥有者和组：</a:t>
+            </a:r>
+            <a:r>
+              <a:rPr lang="en-US" sz="1400" dirty="0" smtClean="0"/>
+              <a:t> </a:t>
+            </a:r>
+            <a:r>
+              <a:rPr lang="en-US" sz="1400" dirty="0" err="1" smtClean="0">
+                <a:solidFill>
+                  <a:schemeClr val="tx2">
+                    <a:lumMod val="60000"/>
+                    <a:lumOff val="40000"/>
+                  </a:schemeClr>
+                </a:solidFill>
+              </a:rPr>
+              <a:t>chown</a:t>
+            </a:r>
+            <a:r>
+              <a:rPr lang="en-US" sz="1400" dirty="0" smtClean="0">
+                <a:solidFill>
+                  <a:schemeClr val="tx2">
+                    <a:lumMod val="60000"/>
+                    <a:lumOff val="40000"/>
+                  </a:schemeClr>
+                </a:solidFill>
+              </a:rPr>
+              <a:t> -R </a:t>
+            </a:r>
+            <a:r>
+              <a:rPr lang="en-US" sz="1400" dirty="0" err="1" smtClean="0">
+                <a:solidFill>
+                  <a:schemeClr val="tx2">
+                    <a:lumMod val="60000"/>
+                    <a:lumOff val="40000"/>
+                  </a:schemeClr>
+                </a:solidFill>
+              </a:rPr>
+              <a:t>git</a:t>
+            </a:r>
+            <a:r>
+              <a:rPr lang="en-US" altLang="zh-CN" sz="1400" dirty="0" err="1" smtClean="0">
+                <a:solidFill>
+                  <a:schemeClr val="tx2">
+                    <a:lumMod val="60000"/>
+                    <a:lumOff val="40000"/>
+                  </a:schemeClr>
+                </a:solidFill>
+              </a:rPr>
+              <a:t>admin</a:t>
+            </a:r>
+            <a:r>
+              <a:rPr lang="en-US" sz="1400" dirty="0" err="1" smtClean="0">
+                <a:solidFill>
+                  <a:schemeClr val="tx2">
+                    <a:lumMod val="60000"/>
+                    <a:lumOff val="40000"/>
+                  </a:schemeClr>
+                </a:solidFill>
+              </a:rPr>
+              <a:t>:gitadmin</a:t>
+            </a:r>
+            <a:r>
+              <a:rPr lang="en-US" sz="1400" dirty="0" smtClean="0">
+                <a:solidFill>
+                  <a:schemeClr val="tx2">
+                    <a:lumMod val="60000"/>
+                    <a:lumOff val="40000"/>
+                  </a:schemeClr>
+                </a:solidFill>
+              </a:rPr>
+              <a:t> </a:t>
+            </a:r>
+            <a:r>
+              <a:rPr lang="en-US" altLang="zh-CN" sz="1400" dirty="0" smtClean="0">
+                <a:solidFill>
+                  <a:schemeClr val="tx2">
+                    <a:lumMod val="60000"/>
+                    <a:lumOff val="40000"/>
+                  </a:schemeClr>
+                </a:solidFill>
+              </a:rPr>
+              <a:t>learngit.git</a:t>
+            </a:r>
+            <a:r>
+              <a:rPr lang="en-US" sz="1400" dirty="0" smtClean="0">
+                <a:solidFill>
+                  <a:schemeClr val="tx2">
+                    <a:lumMod val="60000"/>
+                    <a:lumOff val="40000"/>
+                  </a:schemeClr>
+                </a:solidFill>
+              </a:rPr>
+              <a:t>/</a:t>
+            </a:r>
+          </a:p>
+          <a:p>
+            <a:pPr marL="514350" indent="-514350">
+              <a:buNone/>
+            </a:pPr>
+            <a:r>
+              <a:rPr lang="en-US" altLang="zh-CN" sz="1400" dirty="0" smtClean="0"/>
+              <a:t>	</a:t>
+            </a:r>
+            <a:r>
+              <a:rPr lang="zh-CN" altLang="en-US" sz="1400" dirty="0" smtClean="0"/>
+              <a:t>（命令格式：</a:t>
+            </a:r>
+            <a:r>
+              <a:rPr lang="en-US" altLang="zh-CN" sz="1400" dirty="0" err="1" smtClean="0"/>
+              <a:t>chown</a:t>
+            </a:r>
+            <a:r>
+              <a:rPr lang="en-US" altLang="zh-CN" sz="1400" dirty="0" smtClean="0"/>
+              <a:t>[</a:t>
+            </a:r>
+            <a:r>
+              <a:rPr lang="zh-CN" altLang="en-US" sz="1400" dirty="0" smtClean="0"/>
+              <a:t>选项</a:t>
+            </a:r>
+            <a:r>
+              <a:rPr lang="en-US" altLang="zh-CN" sz="1400" dirty="0" smtClean="0"/>
+              <a:t>]...[</a:t>
+            </a:r>
+            <a:r>
+              <a:rPr lang="zh-CN" altLang="en-US" sz="1400" dirty="0" smtClean="0"/>
+              <a:t>拥有者</a:t>
+            </a:r>
+            <a:r>
+              <a:rPr lang="en-US" altLang="zh-CN" sz="1400" dirty="0" smtClean="0"/>
+              <a:t>][:[</a:t>
+            </a:r>
+            <a:r>
+              <a:rPr lang="zh-CN" altLang="en-US" sz="1400" dirty="0" smtClean="0"/>
+              <a:t>组</a:t>
+            </a:r>
+            <a:r>
+              <a:rPr lang="en-US" altLang="zh-CN" sz="1400" dirty="0" smtClean="0"/>
+              <a:t>]]</a:t>
+            </a:r>
+            <a:r>
+              <a:rPr lang="zh-CN" altLang="en-US" sz="1400" dirty="0" smtClean="0"/>
+              <a:t>文件</a:t>
+            </a:r>
+            <a:r>
+              <a:rPr lang="en-US" altLang="zh-CN" sz="1400" dirty="0" smtClean="0"/>
+              <a:t>...-R</a:t>
+            </a:r>
+            <a:r>
+              <a:rPr lang="zh-CN" altLang="en-US" sz="1400" dirty="0" smtClean="0"/>
+              <a:t>表明处理指定目录以及其子目录下的所有文件；使用</a:t>
+            </a:r>
+            <a:r>
+              <a:rPr lang="en-US" altLang="zh-CN" sz="1400" dirty="0" err="1" smtClean="0"/>
+              <a:t>ls</a:t>
+            </a:r>
+            <a:r>
+              <a:rPr lang="en-US" altLang="zh-CN" sz="1400" dirty="0" smtClean="0"/>
+              <a:t> -l</a:t>
+            </a:r>
+            <a:r>
+              <a:rPr lang="zh-CN" altLang="en-US" sz="1400" dirty="0" smtClean="0"/>
+              <a:t>能查看路径下所有文件的拥有者情况）</a:t>
+            </a:r>
+            <a:endParaRPr lang="en-US" altLang="zh-CN" sz="1400" dirty="0" smtClean="0"/>
+          </a:p>
+          <a:p>
+            <a:pPr marL="514350" indent="-514350">
+              <a:buNone/>
+            </a:pPr>
+            <a:endParaRPr lang="en-US" altLang="zh-CN" sz="1600" dirty="0" smtClean="0"/>
+          </a:p>
+        </p:txBody>
+      </p:sp>
+      <p:pic>
+        <p:nvPicPr>
+          <p:cNvPr id="23554" name="Picture 2"/>
+          <p:cNvPicPr>
+            <a:picLocks noChangeAspect="1" noChangeArrowheads="1"/>
+          </p:cNvPicPr>
+          <p:nvPr/>
+        </p:nvPicPr>
+        <p:blipFill>
+          <a:blip r:embed="rId2"/>
+          <a:srcRect/>
+          <a:stretch>
+            <a:fillRect/>
+          </a:stretch>
+        </p:blipFill>
+        <p:spPr bwMode="auto">
+          <a:xfrm>
+            <a:off x="4643438" y="4000504"/>
+            <a:ext cx="3929090" cy="1354859"/>
+          </a:xfrm>
+          <a:prstGeom prst="rect">
+            <a:avLst/>
+          </a:prstGeom>
+          <a:noFill/>
+          <a:ln w="9525">
+            <a:noFill/>
+            <a:miter lim="800000"/>
+            <a:headEnd/>
+            <a:tailEnd/>
+          </a:ln>
+          <a:effectLst/>
+        </p:spPr>
+      </p:pic>
     </p:spTree>
   </p:cSld>
   <p:clrMapOvr>
@@ -19200,6 +20792,2928 @@
           <a:effectLst/>
         </p:spPr>
       </p:pic>
+    </p:spTree>
+  </p:cSld>
+  <p:clrMapOvr>
+    <a:masterClrMapping/>
+  </p:clrMapOvr>
+</p:sld>
+</file>
+
+<file path=ppt/slides/slide50.xml><?xml version="1.0" encoding="utf-8"?>
+<p:sld xmlns:a="http://schemas.openxmlformats.org/drawingml/2006/main" xmlns:r="http://schemas.openxmlformats.org/officeDocument/2006/relationships" xmlns:p="http://schemas.openxmlformats.org/presentationml/2006/main">
+  <p:cSld>
+    <p:spTree>
+      <p:nvGrpSpPr>
+        <p:cNvPr id="1" name=""/>
+        <p:cNvGrpSpPr/>
+        <p:nvPr/>
+      </p:nvGrpSpPr>
+      <p:grpSpPr>
+        <a:xfrm>
+          <a:off x="0" y="0"/>
+          <a:ext cx="0" cy="0"/>
+          <a:chOff x="0" y="0"/>
+          <a:chExt cx="0" cy="0"/>
+        </a:xfrm>
+      </p:grpSpPr>
+      <p:sp>
+        <p:nvSpPr>
+          <p:cNvPr id="3" name="内容占位符 2"/>
+          <p:cNvSpPr>
+            <a:spLocks noGrp="1"/>
+          </p:cNvSpPr>
+          <p:nvPr>
+            <p:ph idx="1"/>
+          </p:nvPr>
+        </p:nvSpPr>
+        <p:spPr>
+          <a:xfrm>
+            <a:off x="457200" y="571480"/>
+            <a:ext cx="8229600" cy="5857916"/>
+          </a:xfrm>
+        </p:spPr>
+        <p:txBody>
+          <a:bodyPr>
+            <a:normAutofit lnSpcReduction="10000"/>
+          </a:bodyPr>
+          <a:lstStyle/>
+          <a:p>
+            <a:pPr>
+              <a:buFont typeface="Wingdings" pitchFamily="2" charset="2"/>
+              <a:buChar char="Ø"/>
+            </a:pPr>
+            <a:r>
+              <a:rPr lang="zh-CN" altLang="en-US" sz="2400" dirty="0" smtClean="0"/>
+              <a:t>从 </a:t>
+            </a:r>
+            <a:r>
+              <a:rPr lang="en-US" sz="2400" dirty="0" smtClean="0"/>
+              <a:t>Linux </a:t>
+            </a:r>
+            <a:r>
+              <a:rPr lang="en-US" sz="2400" dirty="0" err="1" smtClean="0"/>
+              <a:t>Git</a:t>
+            </a:r>
+            <a:r>
+              <a:rPr lang="en-US" sz="2400" dirty="0" smtClean="0"/>
+              <a:t> </a:t>
+            </a:r>
+            <a:r>
+              <a:rPr lang="zh-CN" altLang="en-US" sz="2400" dirty="0" smtClean="0"/>
+              <a:t>服务器上 </a:t>
+            </a:r>
+            <a:r>
+              <a:rPr lang="en-US" sz="2400" dirty="0" smtClean="0"/>
+              <a:t>clone </a:t>
+            </a:r>
+            <a:r>
+              <a:rPr lang="zh-CN" altLang="en-US" sz="2400" dirty="0" smtClean="0"/>
+              <a:t>项目</a:t>
+            </a:r>
+            <a:endParaRPr lang="en-US" altLang="zh-CN" sz="2400" dirty="0" smtClean="0"/>
+          </a:p>
+          <a:p>
+            <a:r>
+              <a:rPr lang="en-US" altLang="zh-CN" sz="1600" dirty="0" err="1" smtClean="0"/>
+              <a:t>ssh</a:t>
+            </a:r>
+            <a:r>
+              <a:rPr lang="zh-CN" altLang="en-US" sz="1600" dirty="0" smtClean="0"/>
+              <a:t>端口为</a:t>
+            </a:r>
+            <a:r>
+              <a:rPr lang="en-US" altLang="zh-CN" sz="1600" dirty="0" smtClean="0"/>
+              <a:t>22</a:t>
+            </a:r>
+            <a:r>
+              <a:rPr lang="zh-CN" altLang="en-US" sz="1600" dirty="0" smtClean="0"/>
+              <a:t>（即默认值），本机</a:t>
+            </a:r>
+            <a:r>
+              <a:rPr lang="en-US" altLang="zh-CN" sz="1600" dirty="0" err="1" smtClean="0"/>
+              <a:t>Git</a:t>
+            </a:r>
+            <a:r>
+              <a:rPr lang="en-US" altLang="zh-CN" sz="1600" dirty="0" smtClean="0"/>
+              <a:t> bash</a:t>
+            </a:r>
+            <a:r>
+              <a:rPr lang="zh-CN" altLang="en-US" sz="1600" dirty="0" smtClean="0"/>
+              <a:t>窗口输入：</a:t>
+            </a:r>
+            <a:endParaRPr lang="en-US" altLang="zh-CN" sz="1600" dirty="0" smtClean="0"/>
+          </a:p>
+          <a:p>
+            <a:pPr>
+              <a:buNone/>
+            </a:pPr>
+            <a:r>
+              <a:rPr lang="en-US" sz="1600" dirty="0" smtClean="0"/>
+              <a:t>	</a:t>
+            </a:r>
+            <a:r>
+              <a:rPr lang="en-US" sz="1600" dirty="0" err="1" smtClean="0">
+                <a:solidFill>
+                  <a:schemeClr val="tx2">
+                    <a:lumMod val="60000"/>
+                    <a:lumOff val="40000"/>
+                  </a:schemeClr>
+                </a:solidFill>
+              </a:rPr>
+              <a:t>git</a:t>
+            </a:r>
+            <a:r>
+              <a:rPr lang="en-US" sz="1600" dirty="0" smtClean="0">
+                <a:solidFill>
+                  <a:schemeClr val="tx2">
+                    <a:lumMod val="60000"/>
+                    <a:lumOff val="40000"/>
+                  </a:schemeClr>
+                </a:solidFill>
+              </a:rPr>
+              <a:t> clone git</a:t>
+            </a:r>
+            <a:r>
+              <a:rPr lang="en-US" altLang="zh-CN" sz="1600" dirty="0" smtClean="0">
+                <a:solidFill>
+                  <a:schemeClr val="tx2">
+                    <a:lumMod val="60000"/>
+                    <a:lumOff val="40000"/>
+                  </a:schemeClr>
+                </a:solidFill>
+              </a:rPr>
+              <a:t>admin</a:t>
+            </a:r>
+            <a:r>
+              <a:rPr lang="en-US" sz="1600" dirty="0" smtClean="0">
+                <a:solidFill>
+                  <a:schemeClr val="tx2">
+                    <a:lumMod val="60000"/>
+                    <a:lumOff val="40000"/>
+                  </a:schemeClr>
+                </a:solidFill>
+              </a:rPr>
+              <a:t>@172.16.5.21:/home/</a:t>
+            </a:r>
+            <a:r>
+              <a:rPr lang="en-US" sz="1600" dirty="0" err="1" smtClean="0">
+                <a:solidFill>
+                  <a:schemeClr val="tx2">
+                    <a:lumMod val="60000"/>
+                    <a:lumOff val="40000"/>
+                  </a:schemeClr>
+                </a:solidFill>
+              </a:rPr>
+              <a:t>gitrepo</a:t>
+            </a:r>
+            <a:r>
+              <a:rPr lang="en-US" sz="1600" dirty="0" smtClean="0">
+                <a:solidFill>
+                  <a:schemeClr val="tx2">
+                    <a:lumMod val="60000"/>
+                    <a:lumOff val="40000"/>
+                  </a:schemeClr>
+                </a:solidFill>
+              </a:rPr>
+              <a:t>/learngit.git</a:t>
+            </a:r>
+          </a:p>
+          <a:p>
+            <a:r>
+              <a:rPr lang="en-US" altLang="zh-CN" sz="1600" dirty="0" err="1" smtClean="0"/>
+              <a:t>ssh</a:t>
+            </a:r>
+            <a:r>
+              <a:rPr lang="zh-CN" altLang="en-US" sz="1600" dirty="0" smtClean="0"/>
+              <a:t>端口不为</a:t>
+            </a:r>
+            <a:r>
+              <a:rPr lang="en-US" altLang="zh-CN" sz="1600" dirty="0" smtClean="0"/>
+              <a:t>22</a:t>
+            </a:r>
+            <a:r>
+              <a:rPr lang="zh-CN" altLang="en-US" sz="1600" dirty="0" smtClean="0"/>
+              <a:t>（假设为</a:t>
+            </a:r>
+            <a:r>
+              <a:rPr lang="en-US" altLang="zh-CN" sz="1600" dirty="0" smtClean="0"/>
+              <a:t>7700</a:t>
+            </a:r>
+            <a:r>
+              <a:rPr lang="zh-CN" altLang="en-US" sz="1600" dirty="0" smtClean="0"/>
+              <a:t>），本机</a:t>
+            </a:r>
+            <a:r>
+              <a:rPr lang="en-US" altLang="zh-CN" sz="1600" dirty="0" err="1" smtClean="0"/>
+              <a:t>Git</a:t>
+            </a:r>
+            <a:r>
+              <a:rPr lang="en-US" altLang="zh-CN" sz="1600" dirty="0" smtClean="0"/>
+              <a:t> bash</a:t>
+            </a:r>
+            <a:r>
+              <a:rPr lang="zh-CN" altLang="en-US" sz="1600" dirty="0" smtClean="0"/>
+              <a:t>窗口输入：</a:t>
+            </a:r>
+            <a:endParaRPr lang="en-US" altLang="zh-CN" sz="1600" dirty="0" smtClean="0"/>
+          </a:p>
+          <a:p>
+            <a:pPr>
+              <a:buNone/>
+            </a:pPr>
+            <a:r>
+              <a:rPr lang="en-US" sz="1600" dirty="0" smtClean="0"/>
+              <a:t>	</a:t>
+            </a:r>
+            <a:r>
+              <a:rPr lang="en-US" sz="1600" dirty="0" err="1" smtClean="0">
+                <a:solidFill>
+                  <a:schemeClr val="tx2">
+                    <a:lumMod val="60000"/>
+                    <a:lumOff val="40000"/>
+                  </a:schemeClr>
+                </a:solidFill>
+              </a:rPr>
+              <a:t>git</a:t>
+            </a:r>
+            <a:r>
+              <a:rPr lang="en-US" sz="1600" dirty="0" smtClean="0">
+                <a:solidFill>
+                  <a:schemeClr val="tx2">
+                    <a:lumMod val="60000"/>
+                    <a:lumOff val="40000"/>
+                  </a:schemeClr>
+                </a:solidFill>
+              </a:rPr>
+              <a:t> clone </a:t>
+            </a:r>
+            <a:r>
+              <a:rPr lang="en-US" altLang="zh-CN" sz="1600" dirty="0" smtClean="0">
+                <a:solidFill>
+                  <a:schemeClr val="tx2">
+                    <a:lumMod val="60000"/>
+                    <a:lumOff val="40000"/>
+                  </a:schemeClr>
+                </a:solidFill>
+              </a:rPr>
+              <a:t>ssh://</a:t>
+            </a:r>
+            <a:r>
+              <a:rPr lang="en-US" sz="1600" dirty="0" smtClean="0">
+                <a:solidFill>
+                  <a:schemeClr val="tx2">
+                    <a:lumMod val="60000"/>
+                    <a:lumOff val="40000"/>
+                  </a:schemeClr>
+                </a:solidFill>
+              </a:rPr>
+              <a:t>gitadmin@172.16.5.21:7700/home/gitrepo/learngit.git</a:t>
+            </a:r>
+          </a:p>
+          <a:p>
+            <a:pPr>
+              <a:buNone/>
+            </a:pPr>
+            <a:r>
+              <a:rPr lang="en-US" altLang="zh-CN" sz="1600" dirty="0" smtClean="0"/>
+              <a:t>	</a:t>
+            </a:r>
+            <a:r>
+              <a:rPr lang="zh-CN" altLang="en-US" sz="1600" dirty="0" smtClean="0"/>
+              <a:t>注：当第一次连接到目标 </a:t>
+            </a:r>
+            <a:r>
+              <a:rPr lang="en-US" altLang="zh-CN" sz="1600" dirty="0" err="1" smtClean="0"/>
+              <a:t>Git</a:t>
+            </a:r>
+            <a:r>
+              <a:rPr lang="en-US" altLang="zh-CN" sz="1600" dirty="0" smtClean="0"/>
+              <a:t> </a:t>
+            </a:r>
+            <a:r>
+              <a:rPr lang="zh-CN" altLang="en-US" sz="1600" dirty="0" smtClean="0"/>
+              <a:t>服务器时会得到一个提示：</a:t>
+            </a:r>
+            <a:endParaRPr lang="en-US" altLang="zh-CN" sz="1600" dirty="0" smtClean="0"/>
+          </a:p>
+          <a:p>
+            <a:pPr>
+              <a:buNone/>
+            </a:pPr>
+            <a:endParaRPr lang="en-US" sz="1600" dirty="0" smtClean="0"/>
+          </a:p>
+          <a:p>
+            <a:pPr>
+              <a:buNone/>
+            </a:pPr>
+            <a:endParaRPr lang="en-US" sz="1600" dirty="0" smtClean="0"/>
+          </a:p>
+          <a:p>
+            <a:pPr>
+              <a:buNone/>
+            </a:pPr>
+            <a:endParaRPr lang="en-US" sz="1600" dirty="0" smtClean="0"/>
+          </a:p>
+          <a:p>
+            <a:pPr>
+              <a:buNone/>
+            </a:pPr>
+            <a:r>
+              <a:rPr lang="en-US" sz="1600" dirty="0" smtClean="0"/>
+              <a:t>	</a:t>
+            </a:r>
+            <a:r>
+              <a:rPr lang="zh-CN" altLang="en-US" sz="1600" dirty="0" smtClean="0"/>
+              <a:t>输入</a:t>
+            </a:r>
+            <a:r>
+              <a:rPr lang="en-US" altLang="zh-CN" sz="1600" dirty="0" smtClean="0"/>
+              <a:t>yes</a:t>
+            </a:r>
+            <a:r>
+              <a:rPr lang="zh-CN" altLang="en-US" sz="1600" dirty="0" smtClean="0"/>
+              <a:t>按回车键，提示：</a:t>
+            </a:r>
+            <a:endParaRPr lang="en-US" altLang="zh-CN" sz="1600" dirty="0" smtClean="0"/>
+          </a:p>
+          <a:p>
+            <a:pPr>
+              <a:buNone/>
+            </a:pPr>
+            <a:endParaRPr lang="en-US" sz="1600" dirty="0" smtClean="0"/>
+          </a:p>
+          <a:p>
+            <a:pPr>
+              <a:buNone/>
+            </a:pPr>
+            <a:r>
+              <a:rPr lang="en-US" altLang="zh-CN" sz="1600" dirty="0" smtClean="0"/>
+              <a:t>	</a:t>
+            </a:r>
+          </a:p>
+          <a:p>
+            <a:pPr>
+              <a:buNone/>
+            </a:pPr>
+            <a:r>
+              <a:rPr lang="en-US" altLang="zh-CN" sz="1600" dirty="0" smtClean="0"/>
+              <a:t>	</a:t>
+            </a:r>
+            <a:r>
+              <a:rPr lang="zh-CN" altLang="en-US" sz="1600" dirty="0" smtClean="0"/>
+              <a:t>此时本机 </a:t>
+            </a:r>
+            <a:r>
+              <a:rPr lang="en-US" altLang="zh-CN" sz="1600" dirty="0" smtClean="0"/>
+              <a:t>C:\Users\</a:t>
+            </a:r>
+            <a:r>
+              <a:rPr lang="zh-CN" altLang="en-US" sz="1600" dirty="0" smtClean="0"/>
+              <a:t>用户名</a:t>
+            </a:r>
+            <a:r>
+              <a:rPr lang="en-US" altLang="zh-CN" sz="1600" dirty="0" smtClean="0"/>
+              <a:t>\.</a:t>
+            </a:r>
+            <a:r>
+              <a:rPr lang="en-US" altLang="zh-CN" sz="1600" dirty="0" err="1" smtClean="0"/>
+              <a:t>ssh</a:t>
+            </a:r>
+            <a:r>
+              <a:rPr lang="en-US" altLang="zh-CN" sz="1600" dirty="0" smtClean="0"/>
+              <a:t> </a:t>
+            </a:r>
+            <a:r>
+              <a:rPr lang="zh-CN" altLang="en-US" sz="1600" dirty="0" smtClean="0"/>
+              <a:t>下会多出一个文件 </a:t>
+            </a:r>
+            <a:r>
+              <a:rPr lang="en-US" altLang="zh-CN" sz="1600" dirty="0" err="1" smtClean="0"/>
+              <a:t>known_hosts</a:t>
+            </a:r>
+            <a:r>
+              <a:rPr lang="zh-CN" altLang="en-US" sz="1600" dirty="0" smtClean="0"/>
+              <a:t>，以后在这台电脑上再次连接目标 </a:t>
+            </a:r>
+            <a:r>
+              <a:rPr lang="en-US" altLang="zh-CN" sz="1600" dirty="0" err="1" smtClean="0"/>
+              <a:t>Git</a:t>
+            </a:r>
+            <a:r>
+              <a:rPr lang="en-US" altLang="zh-CN" sz="1600" dirty="0" smtClean="0"/>
+              <a:t> </a:t>
+            </a:r>
+            <a:r>
+              <a:rPr lang="zh-CN" altLang="en-US" sz="1600" dirty="0" smtClean="0"/>
+              <a:t>服务器时不会再提示上面的语句。</a:t>
+            </a:r>
+            <a:endParaRPr lang="en-US" altLang="zh-CN" sz="1600" dirty="0" smtClean="0"/>
+          </a:p>
+          <a:p>
+            <a:pPr>
+              <a:buNone/>
+            </a:pPr>
+            <a:endParaRPr lang="en-US" sz="1600" dirty="0" smtClean="0"/>
+          </a:p>
+          <a:p>
+            <a:pPr>
+              <a:buNone/>
+            </a:pPr>
+            <a:endParaRPr lang="en-US" sz="1600" dirty="0" smtClean="0"/>
+          </a:p>
+          <a:p>
+            <a:pPr>
+              <a:buNone/>
+            </a:pPr>
+            <a:endParaRPr lang="en-US" sz="1600" dirty="0" smtClean="0"/>
+          </a:p>
+          <a:p>
+            <a:pPr>
+              <a:buNone/>
+            </a:pPr>
+            <a:endParaRPr lang="en-US" sz="1600" dirty="0" smtClean="0"/>
+          </a:p>
+          <a:p>
+            <a:pPr>
+              <a:buNone/>
+            </a:pPr>
+            <a:r>
+              <a:rPr lang="en-US" altLang="zh-CN" sz="1600" dirty="0" smtClean="0"/>
+              <a:t>	</a:t>
+            </a:r>
+            <a:r>
+              <a:rPr lang="zh-CN" altLang="en-US" sz="1600" dirty="0" smtClean="0"/>
+              <a:t>再次输入</a:t>
+            </a:r>
+            <a:r>
+              <a:rPr lang="en-US" sz="1600" dirty="0" err="1" smtClean="0">
+                <a:solidFill>
+                  <a:schemeClr val="tx2">
+                    <a:lumMod val="60000"/>
+                    <a:lumOff val="40000"/>
+                  </a:schemeClr>
+                </a:solidFill>
+              </a:rPr>
+              <a:t>git</a:t>
+            </a:r>
+            <a:r>
+              <a:rPr lang="en-US" sz="1600" dirty="0" smtClean="0">
+                <a:solidFill>
+                  <a:schemeClr val="tx2">
+                    <a:lumMod val="60000"/>
+                    <a:lumOff val="40000"/>
+                  </a:schemeClr>
+                </a:solidFill>
+              </a:rPr>
+              <a:t> clone gitadmin@172.16.5.21:/home/</a:t>
+            </a:r>
+            <a:r>
+              <a:rPr lang="en-US" sz="1600" dirty="0" err="1" smtClean="0">
+                <a:solidFill>
+                  <a:schemeClr val="tx2">
+                    <a:lumMod val="60000"/>
+                    <a:lumOff val="40000"/>
+                  </a:schemeClr>
+                </a:solidFill>
+              </a:rPr>
+              <a:t>gitrepo</a:t>
+            </a:r>
+            <a:r>
+              <a:rPr lang="en-US" sz="1600" dirty="0" smtClean="0">
+                <a:solidFill>
+                  <a:schemeClr val="tx2">
+                    <a:lumMod val="60000"/>
+                    <a:lumOff val="40000"/>
+                  </a:schemeClr>
+                </a:solidFill>
+              </a:rPr>
+              <a:t>/learngit.git</a:t>
+            </a:r>
+            <a:r>
+              <a:rPr lang="zh-CN" altLang="en-US" sz="1600" dirty="0" smtClean="0"/>
+              <a:t>，提示需要输入服务器端的密码，此时可直接输入密码从服务器端</a:t>
+            </a:r>
+            <a:r>
+              <a:rPr lang="en-US" altLang="zh-CN" sz="1600" dirty="0" smtClean="0"/>
+              <a:t>clone</a:t>
+            </a:r>
+            <a:r>
+              <a:rPr lang="zh-CN" altLang="en-US" sz="1600" dirty="0" smtClean="0"/>
+              <a:t>项目（后续操作时每次都需要输入密码）；也可按</a:t>
+            </a:r>
+            <a:r>
+              <a:rPr lang="en-US" altLang="zh-CN" sz="1600" dirty="0" err="1" smtClean="0"/>
+              <a:t>Ctrl+c</a:t>
+            </a:r>
+            <a:r>
+              <a:rPr lang="zh-CN" altLang="en-US" sz="1600" dirty="0" smtClean="0"/>
+              <a:t>退出后，采用 </a:t>
+            </a:r>
+            <a:r>
+              <a:rPr lang="en-US" altLang="zh-CN" sz="1600" dirty="0" smtClean="0"/>
+              <a:t>SSH </a:t>
+            </a:r>
+            <a:r>
+              <a:rPr lang="zh-CN" altLang="en-US" sz="1600" dirty="0" smtClean="0"/>
+              <a:t>公钥来进行后续免密验证。</a:t>
+            </a:r>
+          </a:p>
+          <a:p>
+            <a:pPr>
+              <a:buNone/>
+            </a:pPr>
+            <a:endParaRPr lang="en-US" sz="1600" dirty="0" smtClean="0"/>
+          </a:p>
+          <a:p>
+            <a:pPr>
+              <a:buNone/>
+            </a:pPr>
+            <a:endParaRPr lang="en-US" sz="1600" dirty="0" smtClean="0"/>
+          </a:p>
+          <a:p>
+            <a:pPr>
+              <a:buNone/>
+            </a:pPr>
+            <a:endParaRPr lang="zh-CN" altLang="en-US" sz="1600" dirty="0"/>
+          </a:p>
+        </p:txBody>
+      </p:sp>
+      <p:sp>
+        <p:nvSpPr>
+          <p:cNvPr id="4" name="TextBox 3"/>
+          <p:cNvSpPr txBox="1"/>
+          <p:nvPr/>
+        </p:nvSpPr>
+        <p:spPr>
+          <a:xfrm>
+            <a:off x="928662" y="2285992"/>
+            <a:ext cx="6929486" cy="784830"/>
+          </a:xfrm>
+          <a:prstGeom prst="rect">
+            <a:avLst/>
+          </a:prstGeom>
+          <a:noFill/>
+          <a:ln>
+            <a:solidFill>
+              <a:schemeClr val="tx1"/>
+            </a:solidFill>
+            <a:prstDash val="sysDash"/>
+          </a:ln>
+        </p:spPr>
+        <p:txBody>
+          <a:bodyPr wrap="square" rtlCol="0">
+            <a:spAutoFit/>
+          </a:bodyPr>
+          <a:lstStyle/>
+          <a:p>
+            <a:r>
+              <a:rPr lang="en-US" altLang="zh-CN" sz="1500" dirty="0" smtClean="0"/>
+              <a:t>The authenticity of host '172.16.5.21 (172.16.5.21)' can't be established.</a:t>
+            </a:r>
+          </a:p>
+          <a:p>
+            <a:r>
+              <a:rPr lang="en-US" altLang="zh-CN" sz="1500" dirty="0" smtClean="0"/>
+              <a:t>RSA key fingerprint is SHA256:4inUi481k0NP5D8Xy7316T3iNQq0cvu0+BLkzBIvaT0.</a:t>
+            </a:r>
+          </a:p>
+          <a:p>
+            <a:r>
+              <a:rPr lang="en-US" altLang="zh-CN" sz="1500" dirty="0" smtClean="0"/>
+              <a:t>Are you sure you want to continue connecting (yes/no)? </a:t>
+            </a:r>
+          </a:p>
+        </p:txBody>
+      </p:sp>
+      <p:sp>
+        <p:nvSpPr>
+          <p:cNvPr id="5" name="TextBox 4"/>
+          <p:cNvSpPr txBox="1"/>
+          <p:nvPr/>
+        </p:nvSpPr>
+        <p:spPr>
+          <a:xfrm>
+            <a:off x="928662" y="3500438"/>
+            <a:ext cx="6929486" cy="323165"/>
+          </a:xfrm>
+          <a:prstGeom prst="rect">
+            <a:avLst/>
+          </a:prstGeom>
+          <a:noFill/>
+          <a:ln>
+            <a:solidFill>
+              <a:schemeClr val="tx1"/>
+            </a:solidFill>
+            <a:prstDash val="sysDash"/>
+          </a:ln>
+        </p:spPr>
+        <p:txBody>
+          <a:bodyPr wrap="square" rtlCol="0">
+            <a:spAutoFit/>
+          </a:bodyPr>
+          <a:lstStyle/>
+          <a:p>
+            <a:r>
+              <a:rPr lang="en-US" altLang="zh-CN" sz="1500" dirty="0" smtClean="0"/>
+              <a:t>Warning: Permanently added '172.16.5.21' (RSA) to the list of known hosts.</a:t>
+            </a:r>
+          </a:p>
+        </p:txBody>
+      </p:sp>
+      <p:pic>
+        <p:nvPicPr>
+          <p:cNvPr id="24578" name="Picture 2"/>
+          <p:cNvPicPr>
+            <a:picLocks noChangeAspect="1" noChangeArrowheads="1"/>
+          </p:cNvPicPr>
+          <p:nvPr/>
+        </p:nvPicPr>
+        <p:blipFill>
+          <a:blip r:embed="rId2"/>
+          <a:srcRect/>
+          <a:stretch>
+            <a:fillRect/>
+          </a:stretch>
+        </p:blipFill>
+        <p:spPr bwMode="auto">
+          <a:xfrm>
+            <a:off x="928662" y="4429132"/>
+            <a:ext cx="5214974" cy="995166"/>
+          </a:xfrm>
+          <a:prstGeom prst="rect">
+            <a:avLst/>
+          </a:prstGeom>
+          <a:noFill/>
+          <a:ln w="9525">
+            <a:noFill/>
+            <a:miter lim="800000"/>
+            <a:headEnd/>
+            <a:tailEnd/>
+          </a:ln>
+          <a:effectLst/>
+        </p:spPr>
+      </p:pic>
+    </p:spTree>
+  </p:cSld>
+  <p:clrMapOvr>
+    <a:masterClrMapping/>
+  </p:clrMapOvr>
+</p:sld>
+</file>
+
+<file path=ppt/slides/slide51.xml><?xml version="1.0" encoding="utf-8"?>
+<p:sld xmlns:a="http://schemas.openxmlformats.org/drawingml/2006/main" xmlns:r="http://schemas.openxmlformats.org/officeDocument/2006/relationships" xmlns:p="http://schemas.openxmlformats.org/presentationml/2006/main">
+  <p:cSld>
+    <p:spTree>
+      <p:nvGrpSpPr>
+        <p:cNvPr id="1" name=""/>
+        <p:cNvGrpSpPr/>
+        <p:nvPr/>
+      </p:nvGrpSpPr>
+      <p:grpSpPr>
+        <a:xfrm>
+          <a:off x="0" y="0"/>
+          <a:ext cx="0" cy="0"/>
+          <a:chOff x="0" y="0"/>
+          <a:chExt cx="0" cy="0"/>
+        </a:xfrm>
+      </p:grpSpPr>
+      <p:sp>
+        <p:nvSpPr>
+          <p:cNvPr id="3" name="内容占位符 2"/>
+          <p:cNvSpPr>
+            <a:spLocks noGrp="1"/>
+          </p:cNvSpPr>
+          <p:nvPr>
+            <p:ph idx="1"/>
+          </p:nvPr>
+        </p:nvSpPr>
+        <p:spPr>
+          <a:xfrm>
+            <a:off x="457200" y="1428736"/>
+            <a:ext cx="8329642" cy="4697427"/>
+          </a:xfrm>
+        </p:spPr>
+        <p:txBody>
+          <a:bodyPr/>
+          <a:lstStyle/>
+          <a:p>
+            <a:pPr>
+              <a:buFont typeface="Wingdings" pitchFamily="2" charset="2"/>
+              <a:buChar char="Ø"/>
+            </a:pPr>
+            <a:r>
+              <a:rPr lang="zh-CN" altLang="en-US" sz="2400" dirty="0" smtClean="0"/>
+              <a:t>客户端创建 </a:t>
+            </a:r>
+            <a:r>
+              <a:rPr lang="en-US" altLang="zh-CN" sz="2400" dirty="0" smtClean="0"/>
+              <a:t>SSH </a:t>
+            </a:r>
+            <a:r>
+              <a:rPr lang="zh-CN" altLang="en-US" sz="2400" dirty="0" smtClean="0"/>
+              <a:t>公钥和私钥</a:t>
+            </a:r>
+            <a:endParaRPr lang="en-US" altLang="zh-CN" sz="2400" dirty="0" smtClean="0"/>
+          </a:p>
+          <a:p>
+            <a:r>
+              <a:rPr lang="zh-CN" altLang="en-US" sz="1600" dirty="0" smtClean="0"/>
+              <a:t>查看本机</a:t>
+            </a:r>
+            <a:r>
+              <a:rPr lang="en-US" sz="1600" dirty="0" smtClean="0"/>
+              <a:t>C:\Users\</a:t>
+            </a:r>
+            <a:r>
+              <a:rPr lang="zh-CN" altLang="en-US" sz="1600" dirty="0" smtClean="0"/>
+              <a:t>用户名</a:t>
+            </a:r>
+            <a:r>
+              <a:rPr lang="en-US" altLang="zh-CN" sz="1600" dirty="0" smtClean="0"/>
+              <a:t>\.</a:t>
+            </a:r>
+            <a:r>
+              <a:rPr lang="en-US" sz="1600" dirty="0" err="1" smtClean="0"/>
+              <a:t>ssh</a:t>
+            </a:r>
+            <a:r>
+              <a:rPr lang="en-US" sz="1600" dirty="0" smtClean="0"/>
+              <a:t> </a:t>
+            </a:r>
+            <a:r>
+              <a:rPr lang="zh-CN" altLang="en-US" sz="1600" dirty="0" smtClean="0"/>
+              <a:t>下是否有</a:t>
+            </a:r>
+            <a:r>
+              <a:rPr lang="en-US" sz="1600" dirty="0" err="1" smtClean="0"/>
+              <a:t>id_rsa</a:t>
+            </a:r>
+            <a:r>
+              <a:rPr lang="en-US" sz="1600" dirty="0" smtClean="0"/>
+              <a:t> </a:t>
+            </a:r>
+            <a:r>
+              <a:rPr lang="zh-CN" altLang="en-US" sz="1600" dirty="0" smtClean="0"/>
+              <a:t>和 </a:t>
+            </a:r>
+            <a:r>
+              <a:rPr lang="en-US" sz="1600" dirty="0" smtClean="0"/>
+              <a:t>id_rsa.pub</a:t>
+            </a:r>
+            <a:r>
+              <a:rPr lang="zh-CN" altLang="en-US" sz="1600" dirty="0" smtClean="0"/>
+              <a:t>两个文件，没有则在</a:t>
+            </a:r>
+            <a:r>
+              <a:rPr lang="en-US" altLang="zh-CN" sz="1600" dirty="0" err="1" smtClean="0"/>
+              <a:t>Git</a:t>
+            </a:r>
+            <a:r>
+              <a:rPr lang="en-US" altLang="zh-CN" sz="1600" dirty="0" smtClean="0"/>
+              <a:t> bash</a:t>
+            </a:r>
+            <a:r>
+              <a:rPr lang="zh-CN" altLang="en-US" sz="1600" dirty="0" smtClean="0"/>
+              <a:t>窗口中输入：</a:t>
+            </a:r>
+            <a:r>
+              <a:rPr lang="de-DE" sz="1600" dirty="0" smtClean="0"/>
+              <a:t> </a:t>
+            </a:r>
+            <a:r>
+              <a:rPr lang="de-DE" sz="1600" dirty="0" smtClean="0">
+                <a:solidFill>
+                  <a:schemeClr val="tx2">
+                    <a:lumMod val="60000"/>
+                    <a:lumOff val="40000"/>
+                  </a:schemeClr>
+                </a:solidFill>
+              </a:rPr>
+              <a:t>ssh-keygen -t rsa -C “</a:t>
+            </a:r>
+            <a:r>
+              <a:rPr lang="zh-CN" altLang="en-US" sz="1600" dirty="0" smtClean="0">
+                <a:solidFill>
+                  <a:schemeClr val="tx2">
+                    <a:lumMod val="60000"/>
+                    <a:lumOff val="40000"/>
+                  </a:schemeClr>
+                </a:solidFill>
+              </a:rPr>
+              <a:t>邮箱</a:t>
+            </a:r>
+            <a:r>
+              <a:rPr lang="de-DE" sz="1600" dirty="0" smtClean="0">
+                <a:solidFill>
+                  <a:schemeClr val="tx2">
+                    <a:lumMod val="60000"/>
+                    <a:lumOff val="40000"/>
+                  </a:schemeClr>
+                </a:solidFill>
+              </a:rPr>
+              <a:t>”</a:t>
+            </a:r>
+            <a:r>
+              <a:rPr lang="zh-CN" altLang="en-US" sz="1600" dirty="0" smtClean="0"/>
+              <a:t>，之后一直按回车键，完成后 </a:t>
+            </a:r>
+            <a:r>
+              <a:rPr lang="en-US" sz="1600" dirty="0" smtClean="0"/>
+              <a:t>C:\Users\</a:t>
+            </a:r>
+            <a:r>
+              <a:rPr lang="zh-CN" altLang="en-US" sz="1600" dirty="0" smtClean="0"/>
+              <a:t>用户名</a:t>
+            </a:r>
+            <a:r>
+              <a:rPr lang="en-US" altLang="zh-CN" sz="1600" dirty="0" smtClean="0"/>
+              <a:t>\.</a:t>
+            </a:r>
+            <a:r>
+              <a:rPr lang="en-US" sz="1600" dirty="0" err="1" smtClean="0"/>
+              <a:t>ssh</a:t>
+            </a:r>
+            <a:r>
+              <a:rPr lang="en-US" sz="1600" dirty="0" smtClean="0"/>
+              <a:t> </a:t>
+            </a:r>
+            <a:r>
+              <a:rPr lang="zh-CN" altLang="en-US" sz="1600" dirty="0" smtClean="0"/>
+              <a:t>下会生成两个文件 </a:t>
+            </a:r>
+            <a:r>
+              <a:rPr lang="en-US" sz="1600" dirty="0" err="1" smtClean="0"/>
+              <a:t>id_rsa</a:t>
+            </a:r>
+            <a:r>
+              <a:rPr lang="en-US" sz="1600" dirty="0" smtClean="0"/>
+              <a:t> </a:t>
+            </a:r>
+            <a:r>
+              <a:rPr lang="zh-CN" altLang="en-US" sz="1600" dirty="0" smtClean="0"/>
+              <a:t>和 </a:t>
+            </a:r>
+            <a:r>
+              <a:rPr lang="en-US" sz="1600" dirty="0" smtClean="0"/>
+              <a:t>id_rsa.pub</a:t>
+            </a:r>
+            <a:r>
+              <a:rPr lang="zh-CN" altLang="en-US" sz="1600" dirty="0" smtClean="0"/>
+              <a:t>，其中</a:t>
+            </a:r>
+            <a:r>
+              <a:rPr lang="en-US" sz="1600" dirty="0" err="1" smtClean="0"/>
+              <a:t>id_rsa</a:t>
+            </a:r>
+            <a:r>
+              <a:rPr lang="en-US" sz="1600" dirty="0" smtClean="0"/>
+              <a:t> </a:t>
+            </a:r>
+            <a:r>
+              <a:rPr lang="zh-CN" altLang="en-US" sz="1600" dirty="0" smtClean="0"/>
+              <a:t>是私钥，</a:t>
+            </a:r>
+            <a:r>
+              <a:rPr lang="en-US" sz="1600" dirty="0" smtClean="0"/>
+              <a:t>id_rsa.pub </a:t>
+            </a:r>
+            <a:r>
+              <a:rPr lang="zh-CN" altLang="en-US" sz="1600" dirty="0" smtClean="0"/>
+              <a:t>是公钥。</a:t>
+            </a:r>
+          </a:p>
+        </p:txBody>
+      </p:sp>
+      <p:pic>
+        <p:nvPicPr>
+          <p:cNvPr id="26626" name="Picture 2"/>
+          <p:cNvPicPr>
+            <a:picLocks noChangeAspect="1" noChangeArrowheads="1"/>
+          </p:cNvPicPr>
+          <p:nvPr/>
+        </p:nvPicPr>
+        <p:blipFill>
+          <a:blip r:embed="rId2"/>
+          <a:srcRect/>
+          <a:stretch>
+            <a:fillRect/>
+          </a:stretch>
+        </p:blipFill>
+        <p:spPr bwMode="auto">
+          <a:xfrm>
+            <a:off x="857224" y="2786058"/>
+            <a:ext cx="3643338" cy="2272577"/>
+          </a:xfrm>
+          <a:prstGeom prst="rect">
+            <a:avLst/>
+          </a:prstGeom>
+          <a:noFill/>
+          <a:ln w="9525">
+            <a:noFill/>
+            <a:miter lim="800000"/>
+            <a:headEnd/>
+            <a:tailEnd/>
+          </a:ln>
+          <a:effectLst/>
+        </p:spPr>
+      </p:pic>
+      <p:pic>
+        <p:nvPicPr>
+          <p:cNvPr id="26627" name="Picture 3"/>
+          <p:cNvPicPr>
+            <a:picLocks noChangeAspect="1" noChangeArrowheads="1"/>
+          </p:cNvPicPr>
+          <p:nvPr/>
+        </p:nvPicPr>
+        <p:blipFill>
+          <a:blip r:embed="rId3"/>
+          <a:srcRect/>
+          <a:stretch>
+            <a:fillRect/>
+          </a:stretch>
+        </p:blipFill>
+        <p:spPr bwMode="auto">
+          <a:xfrm>
+            <a:off x="857224" y="5214950"/>
+            <a:ext cx="3643338" cy="1202655"/>
+          </a:xfrm>
+          <a:prstGeom prst="rect">
+            <a:avLst/>
+          </a:prstGeom>
+          <a:noFill/>
+          <a:ln w="9525">
+            <a:noFill/>
+            <a:miter lim="800000"/>
+            <a:headEnd/>
+            <a:tailEnd/>
+          </a:ln>
+          <a:effectLst/>
+        </p:spPr>
+      </p:pic>
+      <p:sp>
+        <p:nvSpPr>
+          <p:cNvPr id="5" name="标题 1"/>
+          <p:cNvSpPr>
+            <a:spLocks noGrp="1"/>
+          </p:cNvSpPr>
+          <p:nvPr>
+            <p:ph type="title"/>
+          </p:nvPr>
+        </p:nvSpPr>
+        <p:spPr>
+          <a:xfrm>
+            <a:off x="457200" y="274638"/>
+            <a:ext cx="8229600" cy="1143000"/>
+          </a:xfrm>
+        </p:spPr>
+        <p:txBody>
+          <a:bodyPr/>
+          <a:lstStyle/>
+          <a:p>
+            <a:r>
+              <a:rPr lang="zh-CN" altLang="en-US" dirty="0" smtClean="0"/>
+              <a:t>免密验证</a:t>
+            </a:r>
+            <a:endParaRPr lang="zh-CN" altLang="en-US" dirty="0"/>
+          </a:p>
+        </p:txBody>
+      </p:sp>
+    </p:spTree>
+  </p:cSld>
+  <p:clrMapOvr>
+    <a:masterClrMapping/>
+  </p:clrMapOvr>
+</p:sld>
+</file>
+
+<file path=ppt/slides/slide52.xml><?xml version="1.0" encoding="utf-8"?>
+<p:sld xmlns:a="http://schemas.openxmlformats.org/drawingml/2006/main" xmlns:r="http://schemas.openxmlformats.org/officeDocument/2006/relationships" xmlns:p="http://schemas.openxmlformats.org/presentationml/2006/main">
+  <p:cSld>
+    <p:spTree>
+      <p:nvGrpSpPr>
+        <p:cNvPr id="1" name=""/>
+        <p:cNvGrpSpPr/>
+        <p:nvPr/>
+      </p:nvGrpSpPr>
+      <p:grpSpPr>
+        <a:xfrm>
+          <a:off x="0" y="0"/>
+          <a:ext cx="0" cy="0"/>
+          <a:chOff x="0" y="0"/>
+          <a:chExt cx="0" cy="0"/>
+        </a:xfrm>
+      </p:grpSpPr>
+      <p:sp>
+        <p:nvSpPr>
+          <p:cNvPr id="3" name="内容占位符 2"/>
+          <p:cNvSpPr>
+            <a:spLocks noGrp="1"/>
+          </p:cNvSpPr>
+          <p:nvPr>
+            <p:ph idx="1"/>
+          </p:nvPr>
+        </p:nvSpPr>
+        <p:spPr>
+          <a:xfrm>
+            <a:off x="457200" y="571480"/>
+            <a:ext cx="8229600" cy="5554683"/>
+          </a:xfrm>
+        </p:spPr>
+        <p:txBody>
+          <a:bodyPr>
+            <a:normAutofit fontScale="92500" lnSpcReduction="10000"/>
+          </a:bodyPr>
+          <a:lstStyle/>
+          <a:p>
+            <a:pPr>
+              <a:buFont typeface="Wingdings" pitchFamily="2" charset="2"/>
+              <a:buChar char="Ø"/>
+            </a:pPr>
+            <a:r>
+              <a:rPr lang="zh-CN" altLang="en-US" sz="2400" dirty="0" smtClean="0"/>
+              <a:t>服务器端 </a:t>
+            </a:r>
+            <a:r>
+              <a:rPr lang="en-US" altLang="zh-CN" sz="2400" dirty="0" err="1" smtClean="0"/>
+              <a:t>Git</a:t>
+            </a:r>
+            <a:r>
+              <a:rPr lang="en-US" altLang="zh-CN" sz="2400" dirty="0" smtClean="0"/>
+              <a:t> </a:t>
+            </a:r>
+            <a:r>
+              <a:rPr lang="zh-CN" altLang="en-US" sz="2400" dirty="0" smtClean="0"/>
+              <a:t>打开 </a:t>
+            </a:r>
+            <a:r>
+              <a:rPr lang="en-US" altLang="zh-CN" sz="2400" dirty="0" smtClean="0"/>
+              <a:t>RSA </a:t>
+            </a:r>
+            <a:r>
+              <a:rPr lang="zh-CN" altLang="en-US" sz="2400" dirty="0" smtClean="0"/>
+              <a:t>认证</a:t>
+            </a:r>
+          </a:p>
+          <a:p>
+            <a:pPr marL="514350" indent="-514350">
+              <a:buFont typeface="+mj-lt"/>
+              <a:buAutoNum type="arabicPeriod"/>
+            </a:pPr>
+            <a:r>
+              <a:rPr lang="zh-CN" altLang="en-US" sz="1600" dirty="0" smtClean="0"/>
+              <a:t>进入 </a:t>
+            </a:r>
+            <a:r>
+              <a:rPr lang="en-US" altLang="zh-CN" sz="1600" dirty="0" smtClean="0"/>
+              <a:t>/etc/</a:t>
+            </a:r>
+            <a:r>
+              <a:rPr lang="en-US" altLang="zh-CN" sz="1600" dirty="0" err="1" smtClean="0"/>
+              <a:t>ssh</a:t>
+            </a:r>
+            <a:r>
+              <a:rPr lang="en-US" altLang="zh-CN" sz="1600" dirty="0" smtClean="0"/>
+              <a:t> </a:t>
+            </a:r>
+            <a:r>
+              <a:rPr lang="zh-CN" altLang="en-US" sz="1600" dirty="0" smtClean="0"/>
+              <a:t>目录，编辑 </a:t>
+            </a:r>
+            <a:r>
+              <a:rPr lang="en-US" altLang="zh-CN" sz="1600" dirty="0" err="1" smtClean="0"/>
+              <a:t>sshd_config</a:t>
+            </a:r>
+            <a:r>
+              <a:rPr lang="zh-CN" altLang="en-US" sz="1600" dirty="0" smtClean="0"/>
+              <a:t>，打开以下三个配置的注释：</a:t>
+            </a:r>
+            <a:endParaRPr lang="en-US" altLang="zh-CN" sz="1600" dirty="0" smtClean="0"/>
+          </a:p>
+          <a:p>
+            <a:pPr marL="514350" indent="-514350">
+              <a:buFont typeface="+mj-lt"/>
+              <a:buAutoNum type="arabicPeriod"/>
+            </a:pPr>
+            <a:endParaRPr lang="en-US" altLang="zh-CN" sz="1600" dirty="0" smtClean="0"/>
+          </a:p>
+          <a:p>
+            <a:pPr marL="514350" indent="-514350">
+              <a:buFont typeface="+mj-lt"/>
+              <a:buAutoNum type="arabicPeriod"/>
+            </a:pPr>
+            <a:endParaRPr lang="en-US" altLang="zh-CN" sz="1600" dirty="0" smtClean="0"/>
+          </a:p>
+          <a:p>
+            <a:pPr marL="514350" indent="-514350">
+              <a:buFont typeface="+mj-lt"/>
+              <a:buAutoNum type="arabicPeriod"/>
+            </a:pPr>
+            <a:endParaRPr lang="en-US" altLang="zh-CN" sz="1600" dirty="0" smtClean="0"/>
+          </a:p>
+          <a:p>
+            <a:pPr marL="514350" indent="-514350">
+              <a:buFont typeface="+mj-lt"/>
+              <a:buAutoNum type="arabicPeriod"/>
+            </a:pPr>
+            <a:endParaRPr lang="en-US" altLang="zh-CN" sz="1600" dirty="0" smtClean="0"/>
+          </a:p>
+          <a:p>
+            <a:pPr marL="514350" indent="-514350">
+              <a:buFont typeface="+mj-lt"/>
+              <a:buAutoNum type="arabicPeriod"/>
+            </a:pPr>
+            <a:endParaRPr lang="en-US" altLang="zh-CN" sz="1600" dirty="0" smtClean="0"/>
+          </a:p>
+          <a:p>
+            <a:pPr marL="514350" indent="-514350">
+              <a:buFont typeface="+mj-lt"/>
+              <a:buAutoNum type="arabicPeriod"/>
+            </a:pPr>
+            <a:endParaRPr lang="en-US" altLang="zh-CN" sz="1600" dirty="0" smtClean="0"/>
+          </a:p>
+          <a:p>
+            <a:pPr marL="514350" indent="-514350">
+              <a:buFont typeface="+mj-lt"/>
+              <a:buAutoNum type="arabicPeriod"/>
+            </a:pPr>
+            <a:r>
+              <a:rPr lang="zh-CN" altLang="en-US" sz="1600" dirty="0" smtClean="0"/>
+              <a:t>保存并重启 </a:t>
+            </a:r>
+            <a:r>
+              <a:rPr lang="en-US" altLang="zh-CN" sz="1600" dirty="0" err="1" smtClean="0"/>
+              <a:t>sshd</a:t>
+            </a:r>
+            <a:r>
+              <a:rPr lang="en-US" altLang="zh-CN" sz="1600" dirty="0" smtClean="0"/>
+              <a:t> </a:t>
+            </a:r>
+            <a:r>
+              <a:rPr lang="zh-CN" altLang="en-US" sz="1600" dirty="0" smtClean="0"/>
+              <a:t>服务：</a:t>
+            </a:r>
+            <a:r>
+              <a:rPr lang="en-US" sz="1600" dirty="0" smtClean="0">
+                <a:solidFill>
+                  <a:schemeClr val="tx2">
+                    <a:lumMod val="60000"/>
+                    <a:lumOff val="40000"/>
+                  </a:schemeClr>
+                </a:solidFill>
+              </a:rPr>
+              <a:t>/etc/</a:t>
+            </a:r>
+            <a:r>
+              <a:rPr lang="en-US" sz="1600" dirty="0" err="1" smtClean="0">
+                <a:solidFill>
+                  <a:schemeClr val="tx2">
+                    <a:lumMod val="60000"/>
+                    <a:lumOff val="40000"/>
+                  </a:schemeClr>
+                </a:solidFill>
+              </a:rPr>
+              <a:t>rc.d</a:t>
+            </a:r>
+            <a:r>
+              <a:rPr lang="en-US" sz="1600" dirty="0" smtClean="0">
+                <a:solidFill>
+                  <a:schemeClr val="tx2">
+                    <a:lumMod val="60000"/>
+                    <a:lumOff val="40000"/>
+                  </a:schemeClr>
+                </a:solidFill>
+              </a:rPr>
+              <a:t>/</a:t>
+            </a:r>
+            <a:r>
+              <a:rPr lang="en-US" sz="1600" dirty="0" err="1" smtClean="0">
+                <a:solidFill>
+                  <a:schemeClr val="tx2">
+                    <a:lumMod val="60000"/>
+                    <a:lumOff val="40000"/>
+                  </a:schemeClr>
+                </a:solidFill>
+              </a:rPr>
+              <a:t>init.d</a:t>
+            </a:r>
+            <a:r>
+              <a:rPr lang="en-US" sz="1600" dirty="0" smtClean="0">
+                <a:solidFill>
+                  <a:schemeClr val="tx2">
+                    <a:lumMod val="60000"/>
+                    <a:lumOff val="40000"/>
+                  </a:schemeClr>
+                </a:solidFill>
+              </a:rPr>
+              <a:t>/</a:t>
+            </a:r>
+            <a:r>
+              <a:rPr lang="en-US" sz="1600" dirty="0" err="1" smtClean="0">
+                <a:solidFill>
+                  <a:schemeClr val="tx2">
+                    <a:lumMod val="60000"/>
+                    <a:lumOff val="40000"/>
+                  </a:schemeClr>
+                </a:solidFill>
+              </a:rPr>
+              <a:t>sshd</a:t>
+            </a:r>
+            <a:r>
+              <a:rPr lang="en-US" sz="1600" dirty="0" smtClean="0">
+                <a:solidFill>
+                  <a:schemeClr val="tx2">
+                    <a:lumMod val="60000"/>
+                    <a:lumOff val="40000"/>
+                  </a:schemeClr>
+                </a:solidFill>
+              </a:rPr>
+              <a:t> restart</a:t>
+            </a:r>
+          </a:p>
+          <a:p>
+            <a:pPr marL="514350" indent="-514350">
+              <a:buFont typeface="+mj-lt"/>
+              <a:buAutoNum type="arabicPeriod"/>
+            </a:pPr>
+            <a:endParaRPr lang="en-US" altLang="zh-CN" sz="1600" dirty="0" smtClean="0">
+              <a:solidFill>
+                <a:schemeClr val="tx2">
+                  <a:lumMod val="60000"/>
+                  <a:lumOff val="40000"/>
+                </a:schemeClr>
+              </a:solidFill>
+            </a:endParaRPr>
+          </a:p>
+          <a:p>
+            <a:pPr marL="514350" indent="-514350">
+              <a:buFont typeface="+mj-lt"/>
+              <a:buAutoNum type="arabicPeriod"/>
+            </a:pPr>
+            <a:endParaRPr lang="en-US" altLang="zh-CN" sz="1600" dirty="0" smtClean="0">
+              <a:solidFill>
+                <a:schemeClr val="tx2">
+                  <a:lumMod val="60000"/>
+                  <a:lumOff val="40000"/>
+                </a:schemeClr>
+              </a:solidFill>
+            </a:endParaRPr>
+          </a:p>
+          <a:p>
+            <a:pPr marL="514350" indent="-514350">
+              <a:buFont typeface="+mj-lt"/>
+              <a:buAutoNum type="arabicPeriod"/>
+            </a:pPr>
+            <a:endParaRPr lang="en-US" altLang="zh-CN" sz="1600" dirty="0" smtClean="0">
+              <a:solidFill>
+                <a:schemeClr val="tx2">
+                  <a:lumMod val="60000"/>
+                  <a:lumOff val="40000"/>
+                </a:schemeClr>
+              </a:solidFill>
+            </a:endParaRPr>
+          </a:p>
+          <a:p>
+            <a:pPr marL="514350" indent="-514350">
+              <a:buFont typeface="+mj-lt"/>
+              <a:buAutoNum type="arabicPeriod"/>
+            </a:pPr>
+            <a:endParaRPr lang="en-US" altLang="zh-CN" sz="1600" dirty="0" smtClean="0">
+              <a:solidFill>
+                <a:schemeClr val="tx2">
+                  <a:lumMod val="60000"/>
+                  <a:lumOff val="40000"/>
+                </a:schemeClr>
+              </a:solidFill>
+            </a:endParaRPr>
+          </a:p>
+          <a:p>
+            <a:pPr marL="514350" indent="-514350"/>
+            <a:r>
+              <a:rPr lang="zh-CN" altLang="en-US" sz="1600" dirty="0" smtClean="0"/>
+              <a:t>由最上面图中 </a:t>
+            </a:r>
+            <a:r>
+              <a:rPr lang="en-US" sz="1600" dirty="0" err="1" smtClean="0"/>
+              <a:t>AuthorizedKeysFile</a:t>
+            </a:r>
+            <a:r>
+              <a:rPr lang="en-US" sz="1600" dirty="0" smtClean="0"/>
+              <a:t> </a:t>
+            </a:r>
+            <a:r>
+              <a:rPr lang="zh-CN" altLang="en-US" sz="1600" dirty="0" smtClean="0"/>
+              <a:t>得知公钥的存放路径是 </a:t>
+            </a:r>
+            <a:r>
+              <a:rPr lang="en-US" altLang="zh-CN" sz="1600" dirty="0" smtClean="0"/>
+              <a:t>.</a:t>
+            </a:r>
+            <a:r>
+              <a:rPr lang="en-US" sz="1600" dirty="0" err="1" smtClean="0"/>
+              <a:t>ssh</a:t>
+            </a:r>
+            <a:r>
+              <a:rPr lang="en-US" sz="1600" dirty="0" smtClean="0"/>
+              <a:t>/</a:t>
+            </a:r>
+            <a:r>
+              <a:rPr lang="en-US" sz="1600" dirty="0" err="1" smtClean="0"/>
+              <a:t>authorized_keys</a:t>
+            </a:r>
+            <a:r>
+              <a:rPr lang="en-US" sz="1600" dirty="0" smtClean="0"/>
+              <a:t>，</a:t>
+            </a:r>
+            <a:r>
+              <a:rPr lang="zh-CN" altLang="en-US" sz="1600" dirty="0" smtClean="0"/>
+              <a:t>实际上是 </a:t>
+            </a:r>
+            <a:r>
+              <a:rPr lang="en-US" altLang="zh-CN" sz="1600" dirty="0" smtClean="0"/>
+              <a:t>$</a:t>
+            </a:r>
+            <a:r>
+              <a:rPr lang="en-US" sz="1600" dirty="0" smtClean="0"/>
+              <a:t>home/.</a:t>
+            </a:r>
+            <a:r>
+              <a:rPr lang="en-US" sz="1600" dirty="0" err="1" smtClean="0"/>
+              <a:t>ssh</a:t>
+            </a:r>
+            <a:r>
+              <a:rPr lang="en-US" sz="1600" dirty="0" smtClean="0"/>
+              <a:t>/</a:t>
+            </a:r>
+            <a:r>
+              <a:rPr lang="en-US" sz="1600" dirty="0" err="1" smtClean="0"/>
+              <a:t>authorized_keys</a:t>
+            </a:r>
+            <a:r>
+              <a:rPr lang="en-US" sz="1600" dirty="0" smtClean="0"/>
+              <a:t>，</a:t>
+            </a:r>
+            <a:r>
+              <a:rPr lang="zh-CN" altLang="en-US" sz="1600" dirty="0" smtClean="0"/>
+              <a:t>由于管理 </a:t>
+            </a:r>
+            <a:r>
+              <a:rPr lang="en-US" sz="1600" dirty="0" err="1" smtClean="0"/>
+              <a:t>Git</a:t>
+            </a:r>
+            <a:r>
+              <a:rPr lang="en-US" sz="1600" dirty="0" smtClean="0"/>
+              <a:t> </a:t>
+            </a:r>
+            <a:r>
+              <a:rPr lang="zh-CN" altLang="en-US" sz="1600" dirty="0" smtClean="0"/>
+              <a:t>服务的用户是 </a:t>
+            </a:r>
+            <a:r>
+              <a:rPr lang="en-US" sz="1600" dirty="0" err="1" smtClean="0"/>
+              <a:t>git</a:t>
+            </a:r>
+            <a:r>
+              <a:rPr lang="en-US" altLang="zh-CN" sz="1600" dirty="0" err="1" smtClean="0"/>
+              <a:t>admin</a:t>
+            </a:r>
+            <a:r>
+              <a:rPr lang="en-US" sz="1600" dirty="0" smtClean="0"/>
+              <a:t>，</a:t>
+            </a:r>
+            <a:r>
+              <a:rPr lang="zh-CN" altLang="en-US" sz="1600" dirty="0" smtClean="0"/>
+              <a:t>所以实际存放公钥的路径是 </a:t>
+            </a:r>
+            <a:r>
+              <a:rPr lang="en-US" altLang="zh-CN" sz="1600" dirty="0" smtClean="0"/>
+              <a:t>/</a:t>
+            </a:r>
+            <a:r>
+              <a:rPr lang="en-US" sz="1600" dirty="0" smtClean="0"/>
+              <a:t>home/</a:t>
+            </a:r>
+            <a:r>
+              <a:rPr lang="en-US" sz="1600" dirty="0" err="1" smtClean="0"/>
+              <a:t>gitadmin</a:t>
+            </a:r>
+            <a:r>
+              <a:rPr lang="en-US" sz="1600" dirty="0" smtClean="0"/>
+              <a:t>/.</a:t>
+            </a:r>
+            <a:r>
+              <a:rPr lang="en-US" sz="1600" dirty="0" err="1" smtClean="0"/>
+              <a:t>ssh</a:t>
+            </a:r>
+            <a:r>
+              <a:rPr lang="en-US" sz="1600" dirty="0" smtClean="0"/>
+              <a:t>/</a:t>
+            </a:r>
+            <a:r>
+              <a:rPr lang="en-US" sz="1600" dirty="0" err="1" smtClean="0"/>
+              <a:t>authorized_keys</a:t>
+            </a:r>
+            <a:endParaRPr lang="en-US" sz="1600" dirty="0" smtClean="0"/>
+          </a:p>
+          <a:p>
+            <a:pPr marL="514350" indent="-514350">
+              <a:buFont typeface="+mj-lt"/>
+              <a:buAutoNum type="arabicPeriod" startAt="3"/>
+            </a:pPr>
+            <a:r>
+              <a:rPr lang="zh-CN" altLang="en-US" sz="1600" dirty="0" smtClean="0"/>
+              <a:t>在 </a:t>
+            </a:r>
+            <a:r>
+              <a:rPr lang="en-US" altLang="zh-CN" sz="1600" dirty="0" smtClean="0"/>
+              <a:t>/</a:t>
+            </a:r>
+            <a:r>
+              <a:rPr lang="en-US" sz="1600" dirty="0" smtClean="0"/>
+              <a:t>home/</a:t>
+            </a:r>
+            <a:r>
+              <a:rPr lang="en-US" sz="1600" dirty="0" err="1" smtClean="0"/>
+              <a:t>gitadmin</a:t>
+            </a:r>
+            <a:r>
+              <a:rPr lang="en-US" sz="1600" dirty="0" smtClean="0"/>
+              <a:t>/ </a:t>
+            </a:r>
+            <a:r>
+              <a:rPr lang="zh-CN" altLang="en-US" sz="1600" dirty="0" smtClean="0"/>
+              <a:t>下创建目录 </a:t>
+            </a:r>
+            <a:r>
+              <a:rPr lang="en-US" altLang="zh-CN" sz="1600" dirty="0" smtClean="0"/>
+              <a:t>.</a:t>
+            </a:r>
+            <a:r>
+              <a:rPr lang="en-US" sz="1600" dirty="0" err="1" smtClean="0"/>
+              <a:t>ssh</a:t>
+            </a:r>
+            <a:r>
+              <a:rPr lang="zh-CN" altLang="en-US" sz="1600" dirty="0" smtClean="0"/>
+              <a:t>（创建完成后可使用</a:t>
+            </a:r>
+            <a:r>
+              <a:rPr lang="en-US" altLang="zh-CN" sz="1600" dirty="0" err="1" smtClean="0">
+                <a:solidFill>
+                  <a:schemeClr val="tx2">
+                    <a:lumMod val="60000"/>
+                    <a:lumOff val="40000"/>
+                  </a:schemeClr>
+                </a:solidFill>
+              </a:rPr>
+              <a:t>ls</a:t>
+            </a:r>
+            <a:r>
+              <a:rPr lang="en-US" altLang="zh-CN" sz="1600" dirty="0" smtClean="0">
+                <a:solidFill>
+                  <a:schemeClr val="tx2">
+                    <a:lumMod val="60000"/>
+                    <a:lumOff val="40000"/>
+                  </a:schemeClr>
+                </a:solidFill>
+              </a:rPr>
+              <a:t> -a</a:t>
+            </a:r>
+            <a:r>
+              <a:rPr lang="zh-CN" altLang="en-US" sz="1600" dirty="0" smtClean="0"/>
+              <a:t>查看文件）</a:t>
+            </a:r>
+            <a:endParaRPr lang="en-US" sz="1600" dirty="0" smtClean="0"/>
+          </a:p>
+          <a:p>
+            <a:pPr marL="514350" indent="-514350">
+              <a:buNone/>
+            </a:pPr>
+            <a:r>
+              <a:rPr lang="en-US" altLang="zh-CN" sz="1600" dirty="0" smtClean="0">
+                <a:solidFill>
+                  <a:schemeClr val="tx2">
+                    <a:lumMod val="60000"/>
+                    <a:lumOff val="40000"/>
+                  </a:schemeClr>
+                </a:solidFill>
+              </a:rPr>
+              <a:t>	</a:t>
+            </a:r>
+            <a:r>
+              <a:rPr lang="en-US" altLang="zh-CN" sz="1600" dirty="0" err="1" smtClean="0">
+                <a:solidFill>
+                  <a:schemeClr val="tx2">
+                    <a:lumMod val="60000"/>
+                    <a:lumOff val="40000"/>
+                  </a:schemeClr>
+                </a:solidFill>
+              </a:rPr>
+              <a:t>cd</a:t>
+            </a:r>
+            <a:r>
+              <a:rPr lang="en-US" altLang="zh-CN" sz="1600" dirty="0" smtClean="0">
+                <a:solidFill>
+                  <a:schemeClr val="tx2">
+                    <a:lumMod val="60000"/>
+                    <a:lumOff val="40000"/>
+                  </a:schemeClr>
+                </a:solidFill>
+              </a:rPr>
+              <a:t>  /</a:t>
+            </a:r>
+            <a:r>
+              <a:rPr lang="en-US" sz="1600" dirty="0" smtClean="0">
+                <a:solidFill>
+                  <a:schemeClr val="tx2">
+                    <a:lumMod val="60000"/>
+                    <a:lumOff val="40000"/>
+                  </a:schemeClr>
+                </a:solidFill>
+              </a:rPr>
+              <a:t>home/</a:t>
+            </a:r>
+            <a:r>
+              <a:rPr lang="en-US" sz="1600" dirty="0" err="1" smtClean="0">
+                <a:solidFill>
+                  <a:schemeClr val="tx2">
+                    <a:lumMod val="60000"/>
+                    <a:lumOff val="40000"/>
+                  </a:schemeClr>
+                </a:solidFill>
+              </a:rPr>
+              <a:t>gitadmin</a:t>
+            </a:r>
+            <a:endParaRPr lang="en-US" sz="1600" dirty="0" smtClean="0">
+              <a:solidFill>
+                <a:schemeClr val="tx2">
+                  <a:lumMod val="60000"/>
+                  <a:lumOff val="40000"/>
+                </a:schemeClr>
+              </a:solidFill>
+            </a:endParaRPr>
+          </a:p>
+          <a:p>
+            <a:pPr marL="514350" indent="-514350">
+              <a:buNone/>
+            </a:pPr>
+            <a:r>
+              <a:rPr lang="en-US" altLang="zh-CN" sz="1600" dirty="0" smtClean="0">
+                <a:solidFill>
+                  <a:schemeClr val="tx2">
+                    <a:lumMod val="60000"/>
+                    <a:lumOff val="40000"/>
+                  </a:schemeClr>
+                </a:solidFill>
+              </a:rPr>
+              <a:t>	</a:t>
+            </a:r>
+            <a:r>
+              <a:rPr lang="en-US" altLang="zh-CN" sz="1600" dirty="0" err="1" smtClean="0">
+                <a:solidFill>
+                  <a:schemeClr val="tx2">
+                    <a:lumMod val="60000"/>
+                    <a:lumOff val="40000"/>
+                  </a:schemeClr>
+                </a:solidFill>
+              </a:rPr>
+              <a:t>mkdir</a:t>
+            </a:r>
+            <a:r>
+              <a:rPr lang="en-US" altLang="zh-CN" sz="1600" dirty="0" smtClean="0">
+                <a:solidFill>
+                  <a:schemeClr val="tx2">
+                    <a:lumMod val="60000"/>
+                    <a:lumOff val="40000"/>
+                  </a:schemeClr>
+                </a:solidFill>
+              </a:rPr>
+              <a:t> .</a:t>
+            </a:r>
+            <a:r>
+              <a:rPr lang="en-US" altLang="zh-CN" sz="1600" dirty="0" err="1" smtClean="0">
+                <a:solidFill>
+                  <a:schemeClr val="tx2">
+                    <a:lumMod val="60000"/>
+                    <a:lumOff val="40000"/>
+                  </a:schemeClr>
+                </a:solidFill>
+              </a:rPr>
+              <a:t>ssh</a:t>
+            </a:r>
+            <a:endParaRPr lang="en-US" altLang="zh-CN" sz="1600" dirty="0" smtClean="0">
+              <a:solidFill>
+                <a:schemeClr val="tx2">
+                  <a:lumMod val="60000"/>
+                  <a:lumOff val="40000"/>
+                </a:schemeClr>
+              </a:solidFill>
+            </a:endParaRPr>
+          </a:p>
+          <a:p>
+            <a:pPr marL="514350" indent="-514350">
+              <a:buFont typeface="+mj-lt"/>
+              <a:buAutoNum type="arabicPeriod" startAt="4"/>
+            </a:pPr>
+            <a:r>
+              <a:rPr lang="zh-CN" altLang="en-US" sz="1600" dirty="0" smtClean="0"/>
+              <a:t>修改</a:t>
+            </a:r>
+            <a:r>
+              <a:rPr lang="en-US" altLang="zh-CN" sz="1600" dirty="0" smtClean="0"/>
+              <a:t>.</a:t>
+            </a:r>
+            <a:r>
+              <a:rPr lang="en-US" altLang="zh-CN" sz="1600" dirty="0" err="1" smtClean="0"/>
+              <a:t>ssh</a:t>
+            </a:r>
+            <a:r>
+              <a:rPr lang="zh-CN" altLang="en-US" sz="1600" dirty="0" smtClean="0"/>
+              <a:t>文件的拥有者（修改完成后可使用</a:t>
+            </a:r>
+            <a:r>
+              <a:rPr lang="en-US" altLang="zh-CN" sz="1600" dirty="0" err="1" smtClean="0"/>
+              <a:t>ll</a:t>
+            </a:r>
+            <a:r>
+              <a:rPr lang="en-US" altLang="zh-CN" sz="1600" dirty="0" smtClean="0"/>
+              <a:t> -a</a:t>
+            </a:r>
+            <a:r>
+              <a:rPr lang="zh-CN" altLang="en-US" sz="1600" dirty="0" smtClean="0"/>
+              <a:t>查看）：</a:t>
+            </a:r>
+            <a:endParaRPr lang="en-US" altLang="zh-CN" sz="1600" dirty="0" smtClean="0"/>
+          </a:p>
+          <a:p>
+            <a:pPr marL="514350" indent="-514350">
+              <a:buNone/>
+            </a:pPr>
+            <a:r>
+              <a:rPr lang="en-US" altLang="zh-CN" sz="1600" dirty="0" smtClean="0">
+                <a:solidFill>
+                  <a:schemeClr val="tx2">
+                    <a:lumMod val="60000"/>
+                    <a:lumOff val="40000"/>
+                  </a:schemeClr>
+                </a:solidFill>
+              </a:rPr>
+              <a:t>	</a:t>
+            </a:r>
+            <a:r>
+              <a:rPr lang="en-US" altLang="zh-CN" sz="1600" dirty="0" err="1" smtClean="0">
+                <a:solidFill>
+                  <a:schemeClr val="tx2">
+                    <a:lumMod val="60000"/>
+                    <a:lumOff val="40000"/>
+                  </a:schemeClr>
+                </a:solidFill>
+              </a:rPr>
+              <a:t>chown</a:t>
+            </a:r>
+            <a:r>
+              <a:rPr lang="en-US" altLang="zh-CN" sz="1600" dirty="0" smtClean="0">
+                <a:solidFill>
+                  <a:schemeClr val="tx2">
+                    <a:lumMod val="60000"/>
+                    <a:lumOff val="40000"/>
+                  </a:schemeClr>
+                </a:solidFill>
+              </a:rPr>
+              <a:t> -R </a:t>
+            </a:r>
+            <a:r>
+              <a:rPr lang="en-US" altLang="zh-CN" sz="1600" dirty="0" err="1" smtClean="0">
+                <a:solidFill>
+                  <a:schemeClr val="tx2">
+                    <a:lumMod val="60000"/>
+                    <a:lumOff val="40000"/>
+                  </a:schemeClr>
+                </a:solidFill>
+              </a:rPr>
+              <a:t>gitadmin:gitadmin</a:t>
+            </a:r>
+            <a:r>
+              <a:rPr lang="en-US" altLang="zh-CN" sz="1600" dirty="0" smtClean="0">
+                <a:solidFill>
+                  <a:schemeClr val="tx2">
+                    <a:lumMod val="60000"/>
+                    <a:lumOff val="40000"/>
+                  </a:schemeClr>
+                </a:solidFill>
+              </a:rPr>
+              <a:t> /</a:t>
+            </a:r>
+            <a:r>
+              <a:rPr lang="en-US" sz="1600" dirty="0" smtClean="0">
+                <a:solidFill>
+                  <a:schemeClr val="tx2">
+                    <a:lumMod val="60000"/>
+                    <a:lumOff val="40000"/>
+                  </a:schemeClr>
+                </a:solidFill>
+              </a:rPr>
+              <a:t>home/</a:t>
+            </a:r>
+            <a:r>
+              <a:rPr lang="en-US" sz="1600" dirty="0" err="1" smtClean="0">
+                <a:solidFill>
+                  <a:schemeClr val="tx2">
+                    <a:lumMod val="60000"/>
+                    <a:lumOff val="40000"/>
+                  </a:schemeClr>
+                </a:solidFill>
+              </a:rPr>
+              <a:t>gitadmin</a:t>
+            </a:r>
+            <a:r>
+              <a:rPr lang="en-US" sz="1600" dirty="0" smtClean="0">
+                <a:solidFill>
+                  <a:schemeClr val="tx2">
+                    <a:lumMod val="60000"/>
+                    <a:lumOff val="40000"/>
+                  </a:schemeClr>
+                </a:solidFill>
+              </a:rPr>
+              <a:t>/.</a:t>
+            </a:r>
+            <a:r>
+              <a:rPr lang="en-US" sz="1600" dirty="0" err="1" smtClean="0">
+                <a:solidFill>
+                  <a:schemeClr val="tx2">
+                    <a:lumMod val="60000"/>
+                    <a:lumOff val="40000"/>
+                  </a:schemeClr>
+                </a:solidFill>
+              </a:rPr>
+              <a:t>ssh</a:t>
+            </a:r>
+            <a:endParaRPr lang="zh-CN" altLang="en-US" sz="1600" dirty="0">
+              <a:solidFill>
+                <a:schemeClr val="tx2">
+                  <a:lumMod val="60000"/>
+                  <a:lumOff val="40000"/>
+                </a:schemeClr>
+              </a:solidFill>
+            </a:endParaRPr>
+          </a:p>
+        </p:txBody>
+      </p:sp>
+      <p:grpSp>
+        <p:nvGrpSpPr>
+          <p:cNvPr id="7" name="组合 6"/>
+          <p:cNvGrpSpPr/>
+          <p:nvPr/>
+        </p:nvGrpSpPr>
+        <p:grpSpPr>
+          <a:xfrm>
+            <a:off x="571472" y="1285860"/>
+            <a:ext cx="7500990" cy="1459661"/>
+            <a:chOff x="571472" y="1500174"/>
+            <a:chExt cx="7500990" cy="1459661"/>
+          </a:xfrm>
+        </p:grpSpPr>
+        <p:pic>
+          <p:nvPicPr>
+            <p:cNvPr id="27650" name="Picture 2"/>
+            <p:cNvPicPr>
+              <a:picLocks noChangeAspect="1" noChangeArrowheads="1"/>
+            </p:cNvPicPr>
+            <p:nvPr/>
+          </p:nvPicPr>
+          <p:blipFill>
+            <a:blip r:embed="rId2"/>
+            <a:srcRect/>
+            <a:stretch>
+              <a:fillRect/>
+            </a:stretch>
+          </p:blipFill>
+          <p:spPr bwMode="auto">
+            <a:xfrm>
+              <a:off x="571472" y="1500174"/>
+              <a:ext cx="3483606" cy="1428760"/>
+            </a:xfrm>
+            <a:prstGeom prst="rect">
+              <a:avLst/>
+            </a:prstGeom>
+            <a:noFill/>
+            <a:ln w="9525">
+              <a:noFill/>
+              <a:miter lim="800000"/>
+              <a:headEnd/>
+              <a:tailEnd/>
+            </a:ln>
+            <a:effectLst/>
+          </p:spPr>
+        </p:pic>
+        <p:pic>
+          <p:nvPicPr>
+            <p:cNvPr id="27651" name="Picture 3"/>
+            <p:cNvPicPr>
+              <a:picLocks noChangeAspect="1" noChangeArrowheads="1"/>
+            </p:cNvPicPr>
+            <p:nvPr/>
+          </p:nvPicPr>
+          <p:blipFill>
+            <a:blip r:embed="rId3"/>
+            <a:srcRect/>
+            <a:stretch>
+              <a:fillRect/>
+            </a:stretch>
+          </p:blipFill>
+          <p:spPr bwMode="auto">
+            <a:xfrm>
+              <a:off x="4786314" y="1500174"/>
+              <a:ext cx="3286148" cy="1459661"/>
+            </a:xfrm>
+            <a:prstGeom prst="rect">
+              <a:avLst/>
+            </a:prstGeom>
+            <a:noFill/>
+            <a:ln w="9525">
+              <a:noFill/>
+              <a:miter lim="800000"/>
+              <a:headEnd/>
+              <a:tailEnd/>
+            </a:ln>
+            <a:effectLst/>
+          </p:spPr>
+        </p:pic>
+        <p:sp>
+          <p:nvSpPr>
+            <p:cNvPr id="6" name="右箭头 5"/>
+            <p:cNvSpPr/>
+            <p:nvPr/>
+          </p:nvSpPr>
+          <p:spPr>
+            <a:xfrm>
+              <a:off x="4214810" y="2214554"/>
+              <a:ext cx="428628" cy="71438"/>
+            </a:xfrm>
+            <a:prstGeom prst="rightArrow">
+              <a:avLst/>
+            </a:prstGeom>
+            <a:solidFill>
+              <a:schemeClr val="tx2">
+                <a:lumMod val="60000"/>
+                <a:lumOff val="40000"/>
+              </a:schemeClr>
+            </a:solidFill>
+            <a:ln>
+              <a:solidFill>
+                <a:schemeClr val="tx2">
+                  <a:lumMod val="60000"/>
+                  <a:lumOff val="40000"/>
+                </a:schemeClr>
+              </a:solidFill>
+            </a:ln>
+          </p:spPr>
+          <p:style>
+            <a:lnRef idx="2">
+              <a:schemeClr val="accent1">
+                <a:shade val="50000"/>
+              </a:schemeClr>
+            </a:lnRef>
+            <a:fillRef idx="1">
+              <a:schemeClr val="accent1"/>
+            </a:fillRef>
+            <a:effectRef idx="0">
+              <a:schemeClr val="accent1"/>
+            </a:effectRef>
+            <a:fontRef idx="minor">
+              <a:schemeClr val="lt1"/>
+            </a:fontRef>
+          </p:style>
+          <p:txBody>
+            <a:bodyPr rtlCol="0" anchor="ctr"/>
+            <a:lstStyle/>
+            <a:p>
+              <a:pPr algn="ctr"/>
+              <a:endParaRPr lang="zh-CN" altLang="en-US"/>
+            </a:p>
+          </p:txBody>
+        </p:sp>
+      </p:grpSp>
+      <p:pic>
+        <p:nvPicPr>
+          <p:cNvPr id="27652" name="Picture 4"/>
+          <p:cNvPicPr>
+            <a:picLocks noChangeAspect="1" noChangeArrowheads="1"/>
+          </p:cNvPicPr>
+          <p:nvPr/>
+        </p:nvPicPr>
+        <p:blipFill>
+          <a:blip r:embed="rId4"/>
+          <a:srcRect/>
+          <a:stretch>
+            <a:fillRect/>
+          </a:stretch>
+        </p:blipFill>
+        <p:spPr bwMode="auto">
+          <a:xfrm>
+            <a:off x="571472" y="3000372"/>
+            <a:ext cx="5229225" cy="866775"/>
+          </a:xfrm>
+          <a:prstGeom prst="rect">
+            <a:avLst/>
+          </a:prstGeom>
+          <a:noFill/>
+          <a:ln w="9525">
+            <a:noFill/>
+            <a:miter lim="800000"/>
+            <a:headEnd/>
+            <a:tailEnd/>
+          </a:ln>
+          <a:effectLst/>
+        </p:spPr>
+      </p:pic>
+      <p:pic>
+        <p:nvPicPr>
+          <p:cNvPr id="27654" name="Picture 6"/>
+          <p:cNvPicPr>
+            <a:picLocks noChangeAspect="1" noChangeArrowheads="1"/>
+          </p:cNvPicPr>
+          <p:nvPr/>
+        </p:nvPicPr>
+        <p:blipFill>
+          <a:blip r:embed="rId5"/>
+          <a:srcRect/>
+          <a:stretch>
+            <a:fillRect/>
+          </a:stretch>
+        </p:blipFill>
+        <p:spPr bwMode="auto">
+          <a:xfrm>
+            <a:off x="5572132" y="4929198"/>
+            <a:ext cx="3000396" cy="1718049"/>
+          </a:xfrm>
+          <a:prstGeom prst="rect">
+            <a:avLst/>
+          </a:prstGeom>
+          <a:noFill/>
+          <a:ln w="9525">
+            <a:noFill/>
+            <a:miter lim="800000"/>
+            <a:headEnd/>
+            <a:tailEnd/>
+          </a:ln>
+          <a:effectLst/>
+        </p:spPr>
+      </p:pic>
+    </p:spTree>
+  </p:cSld>
+  <p:clrMapOvr>
+    <a:masterClrMapping/>
+  </p:clrMapOvr>
+</p:sld>
+</file>
+
+<file path=ppt/slides/slide53.xml><?xml version="1.0" encoding="utf-8"?>
+<p:sld xmlns:a="http://schemas.openxmlformats.org/drawingml/2006/main" xmlns:r="http://schemas.openxmlformats.org/officeDocument/2006/relationships" xmlns:p="http://schemas.openxmlformats.org/presentationml/2006/main">
+  <p:cSld>
+    <p:spTree>
+      <p:nvGrpSpPr>
+        <p:cNvPr id="1" name=""/>
+        <p:cNvGrpSpPr/>
+        <p:nvPr/>
+      </p:nvGrpSpPr>
+      <p:grpSpPr>
+        <a:xfrm>
+          <a:off x="0" y="0"/>
+          <a:ext cx="0" cy="0"/>
+          <a:chOff x="0" y="0"/>
+          <a:chExt cx="0" cy="0"/>
+        </a:xfrm>
+      </p:grpSpPr>
+      <p:sp>
+        <p:nvSpPr>
+          <p:cNvPr id="3" name="内容占位符 2"/>
+          <p:cNvSpPr>
+            <a:spLocks noGrp="1"/>
+          </p:cNvSpPr>
+          <p:nvPr>
+            <p:ph idx="1"/>
+          </p:nvPr>
+        </p:nvSpPr>
+        <p:spPr>
+          <a:xfrm>
+            <a:off x="457200" y="714356"/>
+            <a:ext cx="8229600" cy="6000792"/>
+          </a:xfrm>
+        </p:spPr>
+        <p:txBody>
+          <a:bodyPr/>
+          <a:lstStyle/>
+          <a:p>
+            <a:pPr>
+              <a:lnSpc>
+                <a:spcPct val="90000"/>
+              </a:lnSpc>
+              <a:buFont typeface="Wingdings" pitchFamily="2" charset="2"/>
+              <a:buChar char="Ø"/>
+            </a:pPr>
+            <a:r>
+              <a:rPr lang="zh-CN" altLang="en-US" sz="2400" dirty="0" smtClean="0"/>
+              <a:t>将客户端公钥导入服务器端 的</a:t>
+            </a:r>
+            <a:r>
+              <a:rPr lang="en-US" altLang="zh-CN" sz="2400" dirty="0" smtClean="0"/>
+              <a:t>/</a:t>
+            </a:r>
+            <a:r>
+              <a:rPr lang="en-US" altLang="en-US" sz="2400" dirty="0" smtClean="0"/>
+              <a:t>home/</a:t>
+            </a:r>
+            <a:r>
+              <a:rPr lang="en-US" altLang="en-US" sz="2400" dirty="0" err="1" smtClean="0"/>
+              <a:t>git</a:t>
+            </a:r>
+            <a:r>
+              <a:rPr lang="en-US" altLang="zh-CN" sz="2400" dirty="0" err="1" smtClean="0"/>
+              <a:t>admin</a:t>
+            </a:r>
+            <a:r>
+              <a:rPr lang="en-US" altLang="en-US" sz="2400" dirty="0" smtClean="0"/>
+              <a:t>/.</a:t>
+            </a:r>
+            <a:r>
+              <a:rPr lang="en-US" altLang="en-US" sz="2400" dirty="0" err="1" smtClean="0"/>
+              <a:t>ssh</a:t>
+            </a:r>
+            <a:r>
+              <a:rPr lang="en-US" altLang="en-US" sz="2400" dirty="0" smtClean="0"/>
+              <a:t>/</a:t>
+            </a:r>
+            <a:r>
+              <a:rPr lang="en-US" altLang="en-US" sz="2400" dirty="0" err="1" smtClean="0"/>
+              <a:t>authorized_keys</a:t>
+            </a:r>
+            <a:r>
+              <a:rPr lang="en-US" altLang="en-US" sz="2400" dirty="0" smtClean="0"/>
+              <a:t> </a:t>
+            </a:r>
+            <a:r>
+              <a:rPr lang="zh-CN" altLang="en-US" sz="2400" dirty="0" smtClean="0"/>
+              <a:t>文件中</a:t>
+            </a:r>
+            <a:endParaRPr lang="en-US" altLang="zh-CN" sz="2400" dirty="0" smtClean="0"/>
+          </a:p>
+          <a:p>
+            <a:pPr marL="457200" indent="-457200">
+              <a:lnSpc>
+                <a:spcPct val="90000"/>
+              </a:lnSpc>
+              <a:buFont typeface="+mj-lt"/>
+              <a:buAutoNum type="arabicPeriod"/>
+            </a:pPr>
+            <a:r>
+              <a:rPr lang="zh-CN" altLang="en-US" sz="1600" dirty="0" smtClean="0"/>
+              <a:t>回到 本机</a:t>
+            </a:r>
+            <a:r>
+              <a:rPr lang="en-US" sz="1600" dirty="0" err="1" smtClean="0"/>
+              <a:t>Git</a:t>
+            </a:r>
+            <a:r>
+              <a:rPr lang="en-US" sz="1600" dirty="0" smtClean="0"/>
+              <a:t> Bash </a:t>
+            </a:r>
+            <a:r>
+              <a:rPr lang="zh-CN" altLang="en-US" sz="1600" dirty="0" smtClean="0"/>
+              <a:t>下，导入文件，输入：</a:t>
+            </a:r>
+            <a:endParaRPr lang="en-US" altLang="zh-CN" sz="1600" dirty="0" smtClean="0"/>
+          </a:p>
+          <a:p>
+            <a:pPr marL="457200" indent="-457200">
+              <a:lnSpc>
+                <a:spcPct val="90000"/>
+              </a:lnSpc>
+              <a:buNone/>
+            </a:pPr>
+            <a:r>
+              <a:rPr lang="en-US" sz="1600" dirty="0" smtClean="0">
+                <a:solidFill>
+                  <a:schemeClr val="tx2">
+                    <a:lumMod val="60000"/>
+                    <a:lumOff val="40000"/>
+                  </a:schemeClr>
+                </a:solidFill>
+              </a:rPr>
+              <a:t>	</a:t>
+            </a:r>
+            <a:r>
+              <a:rPr lang="en-US" sz="1600" dirty="0" err="1" smtClean="0">
+                <a:solidFill>
+                  <a:schemeClr val="tx2">
+                    <a:lumMod val="60000"/>
+                    <a:lumOff val="40000"/>
+                  </a:schemeClr>
+                </a:solidFill>
+              </a:rPr>
+              <a:t>ssh</a:t>
+            </a:r>
+            <a:r>
+              <a:rPr lang="en-US" sz="1600" dirty="0" smtClean="0">
+                <a:solidFill>
+                  <a:schemeClr val="tx2">
+                    <a:lumMod val="60000"/>
+                    <a:lumOff val="40000"/>
+                  </a:schemeClr>
+                </a:solidFill>
+              </a:rPr>
+              <a:t> </a:t>
+            </a:r>
+            <a:r>
+              <a:rPr lang="zh-CN" altLang="en-US" sz="1600" dirty="0" smtClean="0">
+                <a:solidFill>
+                  <a:schemeClr val="tx2">
+                    <a:lumMod val="60000"/>
+                    <a:lumOff val="40000"/>
+                  </a:schemeClr>
+                </a:solidFill>
+              </a:rPr>
+              <a:t>用户名</a:t>
+            </a:r>
+            <a:r>
+              <a:rPr lang="en-US" sz="1600" dirty="0" smtClean="0">
+                <a:solidFill>
+                  <a:schemeClr val="tx2">
+                    <a:lumMod val="60000"/>
+                    <a:lumOff val="40000"/>
+                  </a:schemeClr>
+                </a:solidFill>
+              </a:rPr>
+              <a:t>@</a:t>
+            </a:r>
+            <a:r>
+              <a:rPr lang="zh-CN" altLang="en-US" sz="1600" dirty="0" smtClean="0">
+                <a:solidFill>
+                  <a:schemeClr val="tx2">
+                    <a:lumMod val="60000"/>
+                    <a:lumOff val="40000"/>
+                  </a:schemeClr>
+                </a:solidFill>
+              </a:rPr>
+              <a:t>服务器</a:t>
+            </a:r>
+            <a:r>
+              <a:rPr lang="en-US" altLang="zh-CN" sz="1600" dirty="0" smtClean="0">
+                <a:solidFill>
+                  <a:schemeClr val="tx2">
+                    <a:lumMod val="60000"/>
+                    <a:lumOff val="40000"/>
+                  </a:schemeClr>
+                </a:solidFill>
+              </a:rPr>
+              <a:t>IP</a:t>
+            </a:r>
+            <a:r>
+              <a:rPr lang="en-US" sz="1600" dirty="0" smtClean="0">
+                <a:solidFill>
+                  <a:schemeClr val="tx2">
+                    <a:lumMod val="60000"/>
+                    <a:lumOff val="40000"/>
+                  </a:schemeClr>
+                </a:solidFill>
+              </a:rPr>
+              <a:t> 'cat &gt;&gt; .</a:t>
+            </a:r>
+            <a:r>
+              <a:rPr lang="en-US" sz="1600" dirty="0" err="1" smtClean="0">
+                <a:solidFill>
+                  <a:schemeClr val="tx2">
+                    <a:lumMod val="60000"/>
+                    <a:lumOff val="40000"/>
+                  </a:schemeClr>
+                </a:solidFill>
+              </a:rPr>
+              <a:t>ssh</a:t>
+            </a:r>
+            <a:r>
+              <a:rPr lang="en-US" sz="1600" dirty="0" smtClean="0">
+                <a:solidFill>
+                  <a:schemeClr val="tx2">
+                    <a:lumMod val="60000"/>
+                    <a:lumOff val="40000"/>
+                  </a:schemeClr>
+                </a:solidFill>
+              </a:rPr>
+              <a:t>/</a:t>
+            </a:r>
+            <a:r>
+              <a:rPr lang="en-US" sz="1600" dirty="0" err="1" smtClean="0">
+                <a:solidFill>
+                  <a:schemeClr val="tx2">
+                    <a:lumMod val="60000"/>
+                    <a:lumOff val="40000"/>
+                  </a:schemeClr>
+                </a:solidFill>
+              </a:rPr>
+              <a:t>authorized_keys</a:t>
+            </a:r>
+            <a:r>
+              <a:rPr lang="en-US" sz="1600" dirty="0" smtClean="0">
+                <a:solidFill>
+                  <a:schemeClr val="tx2">
+                    <a:lumMod val="60000"/>
+                    <a:lumOff val="40000"/>
+                  </a:schemeClr>
+                </a:solidFill>
+              </a:rPr>
+              <a:t>' &lt; ~/.</a:t>
+            </a:r>
+            <a:r>
+              <a:rPr lang="en-US" sz="1600" dirty="0" err="1" smtClean="0">
+                <a:solidFill>
+                  <a:schemeClr val="tx2">
+                    <a:lumMod val="60000"/>
+                    <a:lumOff val="40000"/>
+                  </a:schemeClr>
+                </a:solidFill>
+              </a:rPr>
+              <a:t>ssh</a:t>
+            </a:r>
+            <a:r>
+              <a:rPr lang="en-US" sz="1600" dirty="0" smtClean="0">
+                <a:solidFill>
+                  <a:schemeClr val="tx2">
+                    <a:lumMod val="60000"/>
+                    <a:lumOff val="40000"/>
+                  </a:schemeClr>
+                </a:solidFill>
+              </a:rPr>
+              <a:t>/id_rsa.pub</a:t>
+            </a:r>
+            <a:endParaRPr lang="en-US" altLang="zh-CN" sz="1600" dirty="0" smtClean="0"/>
+          </a:p>
+          <a:p>
+            <a:pPr marL="457200" indent="-457200">
+              <a:lnSpc>
+                <a:spcPct val="90000"/>
+              </a:lnSpc>
+              <a:buNone/>
+            </a:pPr>
+            <a:r>
+              <a:rPr lang="en-US" sz="1600" dirty="0" smtClean="0"/>
+              <a:t>	</a:t>
+            </a:r>
+            <a:r>
+              <a:rPr lang="zh-CN" altLang="en-US" sz="1600" dirty="0" smtClean="0"/>
+              <a:t>如：</a:t>
+            </a:r>
+            <a:r>
+              <a:rPr lang="en-US" sz="1600" dirty="0" err="1" smtClean="0">
+                <a:solidFill>
+                  <a:schemeClr val="tx2">
+                    <a:lumMod val="60000"/>
+                    <a:lumOff val="40000"/>
+                  </a:schemeClr>
+                </a:solidFill>
+              </a:rPr>
+              <a:t>ssh</a:t>
+            </a:r>
+            <a:r>
+              <a:rPr lang="en-US" sz="1600" dirty="0" smtClean="0">
+                <a:solidFill>
+                  <a:schemeClr val="tx2">
+                    <a:lumMod val="60000"/>
+                    <a:lumOff val="40000"/>
+                  </a:schemeClr>
+                </a:solidFill>
+              </a:rPr>
+              <a:t> gitadmin@172.16.5.21 'cat &gt;&gt; .</a:t>
+            </a:r>
+            <a:r>
+              <a:rPr lang="en-US" sz="1600" dirty="0" err="1" smtClean="0">
+                <a:solidFill>
+                  <a:schemeClr val="tx2">
+                    <a:lumMod val="60000"/>
+                    <a:lumOff val="40000"/>
+                  </a:schemeClr>
+                </a:solidFill>
+              </a:rPr>
+              <a:t>ssh</a:t>
+            </a:r>
+            <a:r>
+              <a:rPr lang="en-US" sz="1600" dirty="0" smtClean="0">
+                <a:solidFill>
+                  <a:schemeClr val="tx2">
+                    <a:lumMod val="60000"/>
+                    <a:lumOff val="40000"/>
+                  </a:schemeClr>
+                </a:solidFill>
+              </a:rPr>
+              <a:t>/</a:t>
+            </a:r>
+            <a:r>
+              <a:rPr lang="en-US" sz="1600" dirty="0" err="1" smtClean="0">
+                <a:solidFill>
+                  <a:schemeClr val="tx2">
+                    <a:lumMod val="60000"/>
+                    <a:lumOff val="40000"/>
+                  </a:schemeClr>
+                </a:solidFill>
+              </a:rPr>
+              <a:t>authorized_keys</a:t>
+            </a:r>
+            <a:r>
+              <a:rPr lang="en-US" sz="1600" dirty="0" smtClean="0">
+                <a:solidFill>
+                  <a:schemeClr val="tx2">
+                    <a:lumMod val="60000"/>
+                    <a:lumOff val="40000"/>
+                  </a:schemeClr>
+                </a:solidFill>
+              </a:rPr>
+              <a:t>' &lt; ~/.</a:t>
+            </a:r>
+            <a:r>
+              <a:rPr lang="en-US" sz="1600" dirty="0" err="1" smtClean="0">
+                <a:solidFill>
+                  <a:schemeClr val="tx2">
+                    <a:lumMod val="60000"/>
+                    <a:lumOff val="40000"/>
+                  </a:schemeClr>
+                </a:solidFill>
+              </a:rPr>
+              <a:t>ssh</a:t>
+            </a:r>
+            <a:r>
+              <a:rPr lang="en-US" sz="1600" dirty="0" smtClean="0">
+                <a:solidFill>
+                  <a:schemeClr val="tx2">
+                    <a:lumMod val="60000"/>
+                    <a:lumOff val="40000"/>
+                  </a:schemeClr>
+                </a:solidFill>
+              </a:rPr>
+              <a:t>/id_rsa.pub</a:t>
+            </a:r>
+          </a:p>
+          <a:p>
+            <a:pPr marL="457200" indent="-457200">
+              <a:lnSpc>
+                <a:spcPct val="90000"/>
+              </a:lnSpc>
+              <a:buFont typeface="+mj-lt"/>
+              <a:buAutoNum type="arabicPeriod" startAt="2"/>
+            </a:pPr>
+            <a:r>
+              <a:rPr lang="zh-CN" altLang="en-US" sz="1600" dirty="0" smtClean="0"/>
+              <a:t>输入服务器端用户名的密码（注：注意数字键的锁定），没有后续提示即表明导入成功，可去服务器端的</a:t>
+            </a:r>
+            <a:r>
+              <a:rPr lang="en-US" altLang="zh-CN" sz="1600" dirty="0" smtClean="0"/>
+              <a:t>/</a:t>
+            </a:r>
+            <a:r>
+              <a:rPr lang="en-US" altLang="en-US" sz="1600" dirty="0" smtClean="0"/>
+              <a:t>home/</a:t>
+            </a:r>
+            <a:r>
+              <a:rPr lang="en-US" altLang="en-US" sz="1600" dirty="0" err="1" smtClean="0"/>
+              <a:t>git</a:t>
+            </a:r>
+            <a:r>
+              <a:rPr lang="en-US" altLang="zh-CN" sz="1600" dirty="0" err="1" smtClean="0"/>
+              <a:t>admin</a:t>
+            </a:r>
+            <a:r>
+              <a:rPr lang="en-US" altLang="en-US" sz="1600" dirty="0" smtClean="0"/>
+              <a:t>/.</a:t>
+            </a:r>
+            <a:r>
+              <a:rPr lang="en-US" altLang="en-US" sz="1600" dirty="0" err="1" smtClean="0"/>
+              <a:t>ssh</a:t>
+            </a:r>
+            <a:r>
+              <a:rPr lang="en-US" altLang="en-US" sz="1600" dirty="0" smtClean="0"/>
+              <a:t>/</a:t>
+            </a:r>
+            <a:r>
+              <a:rPr lang="en-US" altLang="en-US" sz="1600" dirty="0" err="1" smtClean="0"/>
+              <a:t>authorized_keys</a:t>
+            </a:r>
+            <a:r>
+              <a:rPr lang="zh-CN" altLang="en-US" sz="1600" dirty="0" smtClean="0"/>
+              <a:t>文件下查看导入的内容是否为客户端生成的公钥；</a:t>
+            </a:r>
+            <a:endParaRPr lang="en-US" altLang="zh-CN" sz="1600" dirty="0" smtClean="0"/>
+          </a:p>
+          <a:p>
+            <a:pPr marL="457200" indent="-457200">
+              <a:lnSpc>
+                <a:spcPct val="90000"/>
+              </a:lnSpc>
+              <a:buFont typeface="+mj-lt"/>
+              <a:buAutoNum type="arabicPeriod" startAt="2"/>
+            </a:pPr>
+            <a:r>
+              <a:rPr lang="zh-CN" altLang="en-US" sz="1600" dirty="0" smtClean="0"/>
+              <a:t>在服务器端修改 </a:t>
+            </a:r>
+            <a:r>
+              <a:rPr lang="en-US" altLang="zh-CN" sz="1600" dirty="0" smtClean="0"/>
+              <a:t>.</a:t>
+            </a:r>
+            <a:r>
+              <a:rPr lang="en-US" altLang="en-US" sz="1600" dirty="0" err="1" smtClean="0"/>
+              <a:t>ssh</a:t>
+            </a:r>
+            <a:r>
+              <a:rPr lang="en-US" altLang="en-US" sz="1600" dirty="0" smtClean="0"/>
+              <a:t> </a:t>
+            </a:r>
+            <a:r>
+              <a:rPr lang="zh-CN" altLang="en-US" sz="1600" dirty="0" smtClean="0"/>
+              <a:t>目录的权限为 </a:t>
+            </a:r>
+            <a:r>
+              <a:rPr lang="en-US" altLang="zh-CN" sz="1600" dirty="0" smtClean="0"/>
+              <a:t>700</a:t>
+            </a:r>
+            <a:r>
+              <a:rPr lang="zh-CN" altLang="en-US" sz="1600" dirty="0" smtClean="0"/>
+              <a:t>，修改 </a:t>
+            </a:r>
+            <a:r>
+              <a:rPr lang="en-US" altLang="zh-CN" sz="1600" dirty="0" smtClean="0"/>
+              <a:t>.</a:t>
+            </a:r>
+            <a:r>
+              <a:rPr lang="en-US" altLang="en-US" sz="1600" dirty="0" err="1" smtClean="0"/>
+              <a:t>ssh</a:t>
+            </a:r>
+            <a:r>
+              <a:rPr lang="en-US" altLang="en-US" sz="1600" dirty="0" smtClean="0"/>
+              <a:t>/</a:t>
+            </a:r>
+            <a:r>
+              <a:rPr lang="en-US" altLang="en-US" sz="1600" dirty="0" err="1" smtClean="0"/>
+              <a:t>authorized_keys</a:t>
+            </a:r>
+            <a:r>
+              <a:rPr lang="en-US" altLang="en-US" sz="1600" dirty="0" smtClean="0"/>
+              <a:t> </a:t>
+            </a:r>
+            <a:r>
+              <a:rPr lang="zh-CN" altLang="en-US" sz="1600" dirty="0" smtClean="0"/>
+              <a:t>文件的权限为 </a:t>
+            </a:r>
+            <a:r>
+              <a:rPr lang="en-US" altLang="zh-CN" sz="1600" dirty="0" smtClean="0"/>
+              <a:t>600</a:t>
+            </a:r>
+            <a:r>
+              <a:rPr lang="zh-CN" altLang="en-US" sz="1600" dirty="0" smtClean="0"/>
+              <a:t>；</a:t>
+            </a:r>
+          </a:p>
+          <a:p>
+            <a:pPr marL="457200" indent="-457200">
+              <a:lnSpc>
+                <a:spcPct val="90000"/>
+              </a:lnSpc>
+              <a:buFont typeface="+mj-lt"/>
+              <a:buAutoNum type="arabicPeriod" startAt="2"/>
+            </a:pPr>
+            <a:endParaRPr lang="en-US" sz="1600" dirty="0" smtClean="0"/>
+          </a:p>
+          <a:p>
+            <a:pPr>
+              <a:buNone/>
+            </a:pPr>
+            <a:endParaRPr lang="en-US" altLang="zh-CN" dirty="0" smtClean="0"/>
+          </a:p>
+          <a:p>
+            <a:pPr>
+              <a:buFont typeface="Wingdings" pitchFamily="2" charset="2"/>
+              <a:buChar char="Ø"/>
+            </a:pPr>
+            <a:r>
+              <a:rPr lang="zh-CN" altLang="en-US" sz="2400" dirty="0" smtClean="0"/>
+              <a:t>客户端再次 </a:t>
+            </a:r>
+            <a:r>
+              <a:rPr lang="en-US" altLang="zh-CN" sz="2400" dirty="0" smtClean="0"/>
+              <a:t>clone </a:t>
+            </a:r>
+            <a:r>
+              <a:rPr lang="zh-CN" altLang="en-US" sz="2400" dirty="0" smtClean="0"/>
+              <a:t>远程仓库</a:t>
+            </a:r>
+            <a:endParaRPr lang="en-US" altLang="zh-CN" sz="2400" dirty="0" smtClean="0"/>
+          </a:p>
+          <a:p>
+            <a:r>
+              <a:rPr lang="zh-CN" altLang="en-US" sz="1600" dirty="0" smtClean="0"/>
+              <a:t>输入</a:t>
+            </a:r>
+            <a:r>
+              <a:rPr lang="en-US" sz="1600" dirty="0" err="1" smtClean="0">
+                <a:solidFill>
+                  <a:schemeClr val="tx2">
+                    <a:lumMod val="60000"/>
+                    <a:lumOff val="40000"/>
+                  </a:schemeClr>
+                </a:solidFill>
+              </a:rPr>
+              <a:t>git</a:t>
+            </a:r>
+            <a:r>
+              <a:rPr lang="en-US" sz="1600" dirty="0" smtClean="0">
+                <a:solidFill>
+                  <a:schemeClr val="tx2">
+                    <a:lumMod val="60000"/>
+                    <a:lumOff val="40000"/>
+                  </a:schemeClr>
+                </a:solidFill>
+              </a:rPr>
+              <a:t> clone gitadmin@172.16.5.21:/home/</a:t>
+            </a:r>
+            <a:r>
+              <a:rPr lang="en-US" sz="1600" dirty="0" err="1" smtClean="0">
+                <a:solidFill>
+                  <a:schemeClr val="tx2">
+                    <a:lumMod val="60000"/>
+                    <a:lumOff val="40000"/>
+                  </a:schemeClr>
+                </a:solidFill>
+              </a:rPr>
+              <a:t>gitrepo</a:t>
+            </a:r>
+            <a:r>
+              <a:rPr lang="en-US" sz="1600" dirty="0" smtClean="0">
+                <a:solidFill>
+                  <a:schemeClr val="tx2">
+                    <a:lumMod val="60000"/>
+                    <a:lumOff val="40000"/>
+                  </a:schemeClr>
+                </a:solidFill>
+              </a:rPr>
+              <a:t>/learngit.git</a:t>
+            </a:r>
+            <a:r>
+              <a:rPr lang="zh-CN" altLang="en-US" sz="1600" dirty="0" smtClean="0"/>
+              <a:t>即可成功</a:t>
+            </a:r>
+            <a:r>
+              <a:rPr lang="en-US" altLang="zh-CN" sz="1600" dirty="0" smtClean="0"/>
+              <a:t>clone</a:t>
+            </a:r>
+            <a:r>
+              <a:rPr lang="zh-CN" altLang="en-US" sz="1600" dirty="0" smtClean="0"/>
+              <a:t>服务器端的项目到本地。</a:t>
+            </a:r>
+          </a:p>
+          <a:p>
+            <a:pPr>
+              <a:buFont typeface="Wingdings" pitchFamily="2" charset="2"/>
+              <a:buChar char="Ø"/>
+            </a:pPr>
+            <a:r>
+              <a:rPr lang="zh-CN" altLang="en-US" sz="2000" dirty="0" smtClean="0">
+                <a:solidFill>
+                  <a:srgbClr val="FF0000"/>
+                </a:solidFill>
+              </a:rPr>
+              <a:t>*（有问题，暂不操作）</a:t>
+            </a:r>
+            <a:r>
+              <a:rPr lang="zh-CN" altLang="en-US" sz="2000" dirty="0" smtClean="0"/>
+              <a:t>禁止 </a:t>
+            </a:r>
+            <a:r>
+              <a:rPr lang="en-US" altLang="zh-CN" sz="2000" dirty="0" err="1" smtClean="0"/>
+              <a:t>gitadmin</a:t>
+            </a:r>
+            <a:r>
+              <a:rPr lang="en-US" altLang="zh-CN" sz="2000" dirty="0" smtClean="0"/>
+              <a:t> </a:t>
+            </a:r>
+            <a:r>
+              <a:rPr lang="zh-CN" altLang="en-US" sz="2000" dirty="0" smtClean="0"/>
+              <a:t>用户 </a:t>
+            </a:r>
+            <a:r>
+              <a:rPr lang="en-US" altLang="zh-CN" sz="2000" dirty="0" err="1" smtClean="0"/>
+              <a:t>ssh</a:t>
+            </a:r>
+            <a:r>
+              <a:rPr lang="en-US" altLang="zh-CN" sz="2000" dirty="0" smtClean="0"/>
+              <a:t> </a:t>
+            </a:r>
+            <a:r>
+              <a:rPr lang="zh-CN" altLang="en-US" sz="2000" dirty="0" smtClean="0"/>
+              <a:t>登录服务器</a:t>
+            </a:r>
+          </a:p>
+          <a:p>
+            <a:pPr marL="457200" indent="-457200">
+              <a:lnSpc>
+                <a:spcPct val="90000"/>
+              </a:lnSpc>
+            </a:pPr>
+            <a:r>
+              <a:rPr lang="zh-CN" altLang="en-US" sz="1600" dirty="0" smtClean="0"/>
+              <a:t>使用</a:t>
+            </a:r>
+            <a:r>
+              <a:rPr lang="en-US" altLang="zh-CN" sz="1600" dirty="0" smtClean="0"/>
+              <a:t>root</a:t>
+            </a:r>
+            <a:r>
+              <a:rPr lang="zh-CN" altLang="en-US" sz="1600" dirty="0" smtClean="0"/>
+              <a:t>用户在服务器端编辑 </a:t>
+            </a:r>
+            <a:r>
+              <a:rPr lang="en-US" altLang="zh-CN" sz="1600" dirty="0" smtClean="0"/>
+              <a:t>/</a:t>
+            </a:r>
+            <a:r>
+              <a:rPr lang="en-US" altLang="en-US" sz="1600" dirty="0" smtClean="0"/>
+              <a:t>etc/</a:t>
+            </a:r>
+            <a:r>
+              <a:rPr lang="en-US" altLang="en-US" sz="1600" dirty="0" err="1" smtClean="0"/>
+              <a:t>passwd</a:t>
+            </a:r>
+            <a:r>
+              <a:rPr lang="zh-CN" altLang="en-US" sz="1600" dirty="0" smtClean="0"/>
+              <a:t>，此时 </a:t>
+            </a:r>
+            <a:r>
+              <a:rPr lang="en-US" altLang="zh-CN" sz="1600" dirty="0" err="1" smtClean="0"/>
+              <a:t>gitadmin</a:t>
+            </a:r>
+            <a:r>
+              <a:rPr lang="en-US" altLang="zh-CN" sz="1600" dirty="0" smtClean="0"/>
+              <a:t> </a:t>
+            </a:r>
+            <a:r>
+              <a:rPr lang="zh-CN" altLang="en-US" sz="1600" dirty="0" smtClean="0"/>
+              <a:t>用户可以正常通过 </a:t>
+            </a:r>
+            <a:r>
+              <a:rPr lang="en-US" altLang="zh-CN" sz="1600" dirty="0" err="1" smtClean="0"/>
+              <a:t>ssh</a:t>
+            </a:r>
+            <a:r>
+              <a:rPr lang="en-US" altLang="zh-CN" sz="1600" dirty="0" smtClean="0"/>
+              <a:t> </a:t>
+            </a:r>
+            <a:r>
+              <a:rPr lang="zh-CN" altLang="en-US" sz="1600" dirty="0" smtClean="0"/>
+              <a:t>使用 </a:t>
+            </a:r>
+            <a:r>
+              <a:rPr lang="en-US" altLang="zh-CN" sz="1600" dirty="0" err="1" smtClean="0"/>
+              <a:t>git</a:t>
+            </a:r>
+            <a:r>
+              <a:rPr lang="zh-CN" altLang="en-US" sz="1600" dirty="0" smtClean="0"/>
+              <a:t>，但无法通过 </a:t>
+            </a:r>
+            <a:r>
+              <a:rPr lang="en-US" altLang="zh-CN" sz="1600" dirty="0" err="1" smtClean="0"/>
+              <a:t>ssh</a:t>
+            </a:r>
+            <a:r>
+              <a:rPr lang="en-US" altLang="zh-CN" sz="1600" dirty="0" smtClean="0"/>
+              <a:t> </a:t>
+            </a:r>
+            <a:r>
+              <a:rPr lang="zh-CN" altLang="en-US" sz="1600" dirty="0" smtClean="0"/>
+              <a:t>登录系统。</a:t>
+            </a:r>
+            <a:endParaRPr lang="zh-CN" altLang="en-US" sz="1600" dirty="0"/>
+          </a:p>
+        </p:txBody>
+      </p:sp>
+      <p:pic>
+        <p:nvPicPr>
+          <p:cNvPr id="21506" name="Picture 2"/>
+          <p:cNvPicPr>
+            <a:picLocks noChangeAspect="1" noChangeArrowheads="1"/>
+          </p:cNvPicPr>
+          <p:nvPr/>
+        </p:nvPicPr>
+        <p:blipFill>
+          <a:blip r:embed="rId2"/>
+          <a:srcRect/>
+          <a:stretch>
+            <a:fillRect/>
+          </a:stretch>
+        </p:blipFill>
+        <p:spPr bwMode="auto">
+          <a:xfrm>
+            <a:off x="1000100" y="3214686"/>
+            <a:ext cx="4114800" cy="809625"/>
+          </a:xfrm>
+          <a:prstGeom prst="rect">
+            <a:avLst/>
+          </a:prstGeom>
+          <a:noFill/>
+          <a:ln w="9525">
+            <a:noFill/>
+            <a:miter lim="800000"/>
+            <a:headEnd/>
+            <a:tailEnd/>
+          </a:ln>
+          <a:effectLst/>
+        </p:spPr>
+      </p:pic>
+      <p:pic>
+        <p:nvPicPr>
+          <p:cNvPr id="21507" name="Picture 3"/>
+          <p:cNvPicPr>
+            <a:picLocks noChangeAspect="1" noChangeArrowheads="1"/>
+          </p:cNvPicPr>
+          <p:nvPr/>
+        </p:nvPicPr>
+        <p:blipFill>
+          <a:blip r:embed="rId3"/>
+          <a:srcRect/>
+          <a:stretch>
+            <a:fillRect/>
+          </a:stretch>
+        </p:blipFill>
+        <p:spPr bwMode="auto">
+          <a:xfrm>
+            <a:off x="857224" y="6000768"/>
+            <a:ext cx="3339216" cy="571504"/>
+          </a:xfrm>
+          <a:prstGeom prst="rect">
+            <a:avLst/>
+          </a:prstGeom>
+          <a:noFill/>
+          <a:ln w="9525">
+            <a:noFill/>
+            <a:miter lim="800000"/>
+            <a:headEnd/>
+            <a:tailEnd/>
+          </a:ln>
+          <a:effectLst/>
+        </p:spPr>
+      </p:pic>
+      <p:pic>
+        <p:nvPicPr>
+          <p:cNvPr id="21508" name="Picture 4"/>
+          <p:cNvPicPr>
+            <a:picLocks noChangeAspect="1" noChangeArrowheads="1"/>
+          </p:cNvPicPr>
+          <p:nvPr/>
+        </p:nvPicPr>
+        <p:blipFill>
+          <a:blip r:embed="rId4"/>
+          <a:srcRect/>
+          <a:stretch>
+            <a:fillRect/>
+          </a:stretch>
+        </p:blipFill>
+        <p:spPr bwMode="auto">
+          <a:xfrm>
+            <a:off x="5143504" y="6143644"/>
+            <a:ext cx="2850651" cy="357190"/>
+          </a:xfrm>
+          <a:prstGeom prst="rect">
+            <a:avLst/>
+          </a:prstGeom>
+          <a:noFill/>
+          <a:ln w="9525">
+            <a:noFill/>
+            <a:miter lim="800000"/>
+            <a:headEnd/>
+            <a:tailEnd/>
+          </a:ln>
+          <a:effectLst/>
+        </p:spPr>
+      </p:pic>
+      <p:sp>
+        <p:nvSpPr>
+          <p:cNvPr id="6" name="右箭头 5"/>
+          <p:cNvSpPr/>
+          <p:nvPr/>
+        </p:nvSpPr>
+        <p:spPr>
+          <a:xfrm>
+            <a:off x="4429124" y="6286520"/>
+            <a:ext cx="500066" cy="45719"/>
+          </a:xfrm>
+          <a:prstGeom prst="rightArrow">
+            <a:avLst/>
+          </a:prstGeom>
+          <a:solidFill>
+            <a:schemeClr val="tx2">
+              <a:lumMod val="60000"/>
+              <a:lumOff val="40000"/>
+            </a:schemeClr>
+          </a:solidFill>
+          <a:ln>
+            <a:solidFill>
+              <a:schemeClr val="tx2">
+                <a:lumMod val="60000"/>
+                <a:lumOff val="40000"/>
+              </a:schemeClr>
+            </a:solidFill>
+          </a:ln>
+        </p:spPr>
+        <p:style>
+          <a:lnRef idx="2">
+            <a:schemeClr val="accent1">
+              <a:shade val="50000"/>
+            </a:schemeClr>
+          </a:lnRef>
+          <a:fillRef idx="1">
+            <a:schemeClr val="accent1"/>
+          </a:fillRef>
+          <a:effectRef idx="0">
+            <a:schemeClr val="accent1"/>
+          </a:effectRef>
+          <a:fontRef idx="minor">
+            <a:schemeClr val="lt1"/>
+          </a:fontRef>
+        </p:style>
+        <p:txBody>
+          <a:bodyPr rtlCol="0" anchor="ctr"/>
+          <a:lstStyle/>
+          <a:p>
+            <a:pPr algn="ctr"/>
+            <a:endParaRPr lang="zh-CN" altLang="en-US"/>
+          </a:p>
+        </p:txBody>
+      </p:sp>
+    </p:spTree>
+  </p:cSld>
+  <p:clrMapOvr>
+    <a:masterClrMapping/>
+  </p:clrMapOvr>
+</p:sld>
+</file>
+
+<file path=ppt/slides/slide54.xml><?xml version="1.0" encoding="utf-8"?>
+<p:sld xmlns:a="http://schemas.openxmlformats.org/drawingml/2006/main" xmlns:r="http://schemas.openxmlformats.org/officeDocument/2006/relationships" xmlns:p="http://schemas.openxmlformats.org/presentationml/2006/main">
+  <p:cSld>
+    <p:spTree>
+      <p:nvGrpSpPr>
+        <p:cNvPr id="1" name=""/>
+        <p:cNvGrpSpPr/>
+        <p:nvPr/>
+      </p:nvGrpSpPr>
+      <p:grpSpPr>
+        <a:xfrm>
+          <a:off x="0" y="0"/>
+          <a:ext cx="0" cy="0"/>
+          <a:chOff x="0" y="0"/>
+          <a:chExt cx="0" cy="0"/>
+        </a:xfrm>
+      </p:grpSpPr>
+      <p:sp>
+        <p:nvSpPr>
+          <p:cNvPr id="2" name="标题 1"/>
+          <p:cNvSpPr>
+            <a:spLocks noGrp="1"/>
+          </p:cNvSpPr>
+          <p:nvPr>
+            <p:ph type="title"/>
+          </p:nvPr>
+        </p:nvSpPr>
+        <p:spPr/>
+        <p:txBody>
+          <a:bodyPr/>
+          <a:lstStyle/>
+          <a:p>
+            <a:r>
+              <a:rPr lang="zh-CN" altLang="en-US" dirty="0" smtClean="0"/>
+              <a:t>问题汇总</a:t>
+            </a:r>
+            <a:endParaRPr lang="zh-CN" altLang="en-US" dirty="0"/>
+          </a:p>
+        </p:txBody>
+      </p:sp>
+      <p:graphicFrame>
+        <p:nvGraphicFramePr>
+          <p:cNvPr id="6" name="对象 5">
+            <a:hlinkClick r:id="rId3" action="ppaction://hlinkfile"/>
+          </p:cNvPr>
+          <p:cNvGraphicFramePr>
+            <a:graphicFrameLocks noChangeAspect="1"/>
+          </p:cNvGraphicFramePr>
+          <p:nvPr/>
+        </p:nvGraphicFramePr>
+        <p:xfrm>
+          <a:off x="1714480" y="2143116"/>
+          <a:ext cx="914400" cy="828675"/>
+        </p:xfrm>
+        <a:graphic>
+          <a:graphicData uri="http://schemas.openxmlformats.org/presentationml/2006/ole">
+            <p:oleObj spid="_x0000_s8197" name="文档" showAsIcon="1" r:id="rId4" imgW="914400" imgH="828720" progId="Word.Document.12">
+              <p:link updateAutomatic="1"/>
+            </p:oleObj>
+          </a:graphicData>
+        </a:graphic>
+      </p:graphicFrame>
     </p:spTree>
   </p:cSld>
   <p:clrMapOvr>

</xml_diff>